<commit_message>
edit: ppt and docs
</commit_message>
<xml_diff>
--- a/Documentation/Freelancing-Platform.pptx
+++ b/Documentation/Freelancing-Platform.pptx
@@ -7,22 +7,18 @@
   <p:sldIdLst>
     <p:sldId id="256" r:id="rId2"/>
     <p:sldId id="258" r:id="rId3"/>
-    <p:sldId id="259" r:id="rId4"/>
-    <p:sldId id="260" r:id="rId5"/>
-    <p:sldId id="261" r:id="rId6"/>
+    <p:sldId id="260" r:id="rId4"/>
+    <p:sldId id="261" r:id="rId5"/>
+    <p:sldId id="279" r:id="rId6"/>
     <p:sldId id="265" r:id="rId7"/>
     <p:sldId id="264" r:id="rId8"/>
     <p:sldId id="266" r:id="rId9"/>
-    <p:sldId id="277" r:id="rId10"/>
-    <p:sldId id="276" r:id="rId11"/>
-    <p:sldId id="268" r:id="rId12"/>
-    <p:sldId id="269" r:id="rId13"/>
-    <p:sldId id="270" r:id="rId14"/>
-    <p:sldId id="271" r:id="rId15"/>
-    <p:sldId id="272" r:id="rId16"/>
-    <p:sldId id="273" r:id="rId17"/>
-    <p:sldId id="274" r:id="rId18"/>
-    <p:sldId id="275" r:id="rId19"/>
+    <p:sldId id="276" r:id="rId10"/>
+    <p:sldId id="277" r:id="rId11"/>
+    <p:sldId id="272" r:id="rId12"/>
+    <p:sldId id="273" r:id="rId13"/>
+    <p:sldId id="274" r:id="rId14"/>
+    <p:sldId id="278" r:id="rId15"/>
   </p:sldIdLst>
   <p:sldSz cx="12192000" cy="6858000"/>
   <p:notesSz cx="6858000" cy="9144000"/>
@@ -315,7 +311,7 @@
           <a:p>
             <a:fld id="{76C02864-96C3-44B4-ACD4-22E2B7896A37}" type="datetimeFigureOut">
               <a:rPr lang="en-GB" smtClean="0"/>
-              <a:t>25/12/2024</a:t>
+              <a:t>23/02/2025</a:t>
             </a:fld>
             <a:endParaRPr lang="en-GB"/>
           </a:p>
@@ -590,7 +586,7 @@
           <a:p>
             <a:fld id="{76C02864-96C3-44B4-ACD4-22E2B7896A37}" type="datetimeFigureOut">
               <a:rPr lang="en-GB" smtClean="0"/>
-              <a:t>25/12/2024</a:t>
+              <a:t>23/02/2025</a:t>
             </a:fld>
             <a:endParaRPr lang="en-GB"/>
           </a:p>
@@ -784,7 +780,7 @@
           <a:p>
             <a:fld id="{76C02864-96C3-44B4-ACD4-22E2B7896A37}" type="datetimeFigureOut">
               <a:rPr lang="en-GB" smtClean="0"/>
-              <a:t>25/12/2024</a:t>
+              <a:t>23/02/2025</a:t>
             </a:fld>
             <a:endParaRPr lang="en-GB"/>
           </a:p>
@@ -1057,7 +1053,7 @@
           <a:p>
             <a:fld id="{76C02864-96C3-44B4-ACD4-22E2B7896A37}" type="datetimeFigureOut">
               <a:rPr lang="en-GB" smtClean="0"/>
-              <a:t>25/12/2024</a:t>
+              <a:t>23/02/2025</a:t>
             </a:fld>
             <a:endParaRPr lang="en-GB"/>
           </a:p>
@@ -1398,7 +1394,7 @@
           <a:p>
             <a:fld id="{76C02864-96C3-44B4-ACD4-22E2B7896A37}" type="datetimeFigureOut">
               <a:rPr lang="en-GB" smtClean="0"/>
-              <a:t>25/12/2024</a:t>
+              <a:t>23/02/2025</a:t>
             </a:fld>
             <a:endParaRPr lang="en-GB"/>
           </a:p>
@@ -2021,7 +2017,7 @@
           <a:p>
             <a:fld id="{76C02864-96C3-44B4-ACD4-22E2B7896A37}" type="datetimeFigureOut">
               <a:rPr lang="en-GB" smtClean="0"/>
-              <a:t>25/12/2024</a:t>
+              <a:t>23/02/2025</a:t>
             </a:fld>
             <a:endParaRPr lang="en-GB"/>
           </a:p>
@@ -2881,7 +2877,7 @@
           <a:p>
             <a:fld id="{76C02864-96C3-44B4-ACD4-22E2B7896A37}" type="datetimeFigureOut">
               <a:rPr lang="en-GB" smtClean="0"/>
-              <a:t>25/12/2024</a:t>
+              <a:t>23/02/2025</a:t>
             </a:fld>
             <a:endParaRPr lang="en-GB"/>
           </a:p>
@@ -3051,7 +3047,7 @@
           <a:p>
             <a:fld id="{76C02864-96C3-44B4-ACD4-22E2B7896A37}" type="datetimeFigureOut">
               <a:rPr lang="en-GB" smtClean="0"/>
-              <a:t>25/12/2024</a:t>
+              <a:t>23/02/2025</a:t>
             </a:fld>
             <a:endParaRPr lang="en-GB"/>
           </a:p>
@@ -3231,7 +3227,7 @@
           <a:p>
             <a:fld id="{76C02864-96C3-44B4-ACD4-22E2B7896A37}" type="datetimeFigureOut">
               <a:rPr lang="en-GB" smtClean="0"/>
-              <a:t>25/12/2024</a:t>
+              <a:t>23/02/2025</a:t>
             </a:fld>
             <a:endParaRPr lang="en-GB"/>
           </a:p>
@@ -3401,7 +3397,7 @@
           <a:p>
             <a:fld id="{76C02864-96C3-44B4-ACD4-22E2B7896A37}" type="datetimeFigureOut">
               <a:rPr lang="en-GB" smtClean="0"/>
-              <a:t>25/12/2024</a:t>
+              <a:t>23/02/2025</a:t>
             </a:fld>
             <a:endParaRPr lang="en-GB"/>
           </a:p>
@@ -3648,7 +3644,7 @@
           <a:p>
             <a:fld id="{76C02864-96C3-44B4-ACD4-22E2B7896A37}" type="datetimeFigureOut">
               <a:rPr lang="en-GB" smtClean="0"/>
-              <a:t>25/12/2024</a:t>
+              <a:t>23/02/2025</a:t>
             </a:fld>
             <a:endParaRPr lang="en-GB"/>
           </a:p>
@@ -3940,7 +3936,7 @@
           <a:p>
             <a:fld id="{76C02864-96C3-44B4-ACD4-22E2B7896A37}" type="datetimeFigureOut">
               <a:rPr lang="en-GB" smtClean="0"/>
-              <a:t>25/12/2024</a:t>
+              <a:t>23/02/2025</a:t>
             </a:fld>
             <a:endParaRPr lang="en-GB"/>
           </a:p>
@@ -4384,7 +4380,7 @@
           <a:p>
             <a:fld id="{76C02864-96C3-44B4-ACD4-22E2B7896A37}" type="datetimeFigureOut">
               <a:rPr lang="en-GB" smtClean="0"/>
-              <a:t>25/12/2024</a:t>
+              <a:t>23/02/2025</a:t>
             </a:fld>
             <a:endParaRPr lang="en-GB"/>
           </a:p>
@@ -4502,7 +4498,7 @@
           <a:p>
             <a:fld id="{76C02864-96C3-44B4-ACD4-22E2B7896A37}" type="datetimeFigureOut">
               <a:rPr lang="en-GB" smtClean="0"/>
-              <a:t>25/12/2024</a:t>
+              <a:t>23/02/2025</a:t>
             </a:fld>
             <a:endParaRPr lang="en-GB"/>
           </a:p>
@@ -4597,7 +4593,7 @@
           <a:p>
             <a:fld id="{76C02864-96C3-44B4-ACD4-22E2B7896A37}" type="datetimeFigureOut">
               <a:rPr lang="en-GB" smtClean="0"/>
-              <a:t>25/12/2024</a:t>
+              <a:t>23/02/2025</a:t>
             </a:fld>
             <a:endParaRPr lang="en-GB"/>
           </a:p>
@@ -4876,7 +4872,7 @@
           <a:p>
             <a:fld id="{76C02864-96C3-44B4-ACD4-22E2B7896A37}" type="datetimeFigureOut">
               <a:rPr lang="en-GB" smtClean="0"/>
-              <a:t>25/12/2024</a:t>
+              <a:t>23/02/2025</a:t>
             </a:fld>
             <a:endParaRPr lang="en-GB"/>
           </a:p>
@@ -5151,7 +5147,7 @@
           <a:p>
             <a:fld id="{76C02864-96C3-44B4-ACD4-22E2B7896A37}" type="datetimeFigureOut">
               <a:rPr lang="en-GB" smtClean="0"/>
-              <a:t>25/12/2024</a:t>
+              <a:t>23/02/2025</a:t>
             </a:fld>
             <a:endParaRPr lang="en-GB"/>
           </a:p>
@@ -5580,7 +5576,7 @@
           <a:p>
             <a:fld id="{76C02864-96C3-44B4-ACD4-22E2B7896A37}" type="datetimeFigureOut">
               <a:rPr lang="en-GB" smtClean="0"/>
-              <a:t>25/12/2024</a:t>
+              <a:t>23/02/2025</a:t>
             </a:fld>
             <a:endParaRPr lang="en-GB"/>
           </a:p>
@@ -6186,16 +6182,6 @@
             </a:pPr>
             <a:r>
               <a:rPr lang="en-US" sz="2800" dirty="0"/>
-              <a:t>Sabin Gurung</a:t>
-            </a:r>
-          </a:p>
-          <a:p>
-            <a:pPr marL="457200" indent="-457200">
-              <a:buFont typeface="Arial" panose="020B0604020202020204" pitchFamily="34" charset="0"/>
-              <a:buChar char="•"/>
-            </a:pPr>
-            <a:r>
-              <a:rPr lang="en-US" sz="2800" dirty="0"/>
               <a:t>Suyan Thapa</a:t>
             </a:r>
             <a:endParaRPr lang="en-GB" sz="2800" dirty="0"/>
@@ -6223,7 +6209,7 @@
         <p:cNvPr id="1" name="">
           <a:extLst>
             <a:ext uri="{FF2B5EF4-FFF2-40B4-BE49-F238E27FC236}">
-              <a16:creationId xmlns:a16="http://schemas.microsoft.com/office/drawing/2014/main" id="{BEA3E5F7-74BB-6106-3B49-D0F322B2FE0A}"/>
+              <a16:creationId xmlns:a16="http://schemas.microsoft.com/office/drawing/2014/main" id="{1BF3B339-8897-1221-3654-B3F003351004}"/>
             </a:ext>
           </a:extLst>
         </p:cNvPr>
@@ -6243,7 +6229,7 @@
           <p:cNvPr id="2" name="Title 1">
             <a:extLst>
               <a:ext uri="{FF2B5EF4-FFF2-40B4-BE49-F238E27FC236}">
-                <a16:creationId xmlns:a16="http://schemas.microsoft.com/office/drawing/2014/main" id="{0FD4C8C8-65B5-BA27-F8D6-672538516AC6}"/>
+                <a16:creationId xmlns:a16="http://schemas.microsoft.com/office/drawing/2014/main" id="{41D8994F-0BAD-E791-2D18-FA3ACAB2AA1F}"/>
               </a:ext>
             </a:extLst>
           </p:cNvPr>
@@ -6266,7 +6252,7 @@
           <a:p>
             <a:r>
               <a:rPr lang="en-US" dirty="0"/>
-              <a:t>DFD Level -2</a:t>
+              <a:t>ER DIAGRAM</a:t>
             </a:r>
             <a:endParaRPr lang="en-GB" dirty="0"/>
           </a:p>
@@ -6277,7 +6263,7 @@
           <p:cNvPr id="4" name="Picture 3">
             <a:extLst>
               <a:ext uri="{FF2B5EF4-FFF2-40B4-BE49-F238E27FC236}">
-                <a16:creationId xmlns:a16="http://schemas.microsoft.com/office/drawing/2014/main" id="{A4E4193F-2C71-0A94-3538-C98F98E90A5B}"/>
+                <a16:creationId xmlns:a16="http://schemas.microsoft.com/office/drawing/2014/main" id="{193A017D-C17B-3C47-7587-EBC8C00E56A8}"/>
               </a:ext>
             </a:extLst>
           </p:cNvPr>
@@ -6300,8 +6286,8 @@
         </p:blipFill>
         <p:spPr>
           <a:xfrm>
-            <a:off x="1052857" y="331694"/>
-            <a:ext cx="10931954" cy="6311154"/>
+            <a:off x="1992274" y="1174376"/>
+            <a:ext cx="8207451" cy="4228375"/>
           </a:xfrm>
           <a:prstGeom prst="rect">
             <a:avLst/>
@@ -6311,7 +6297,7 @@
     </p:spTree>
     <p:extLst>
       <p:ext uri="{BB962C8B-B14F-4D97-AF65-F5344CB8AC3E}">
-        <p14:creationId xmlns:p14="http://schemas.microsoft.com/office/powerpoint/2010/main" val="226524632"/>
+        <p14:creationId xmlns:p14="http://schemas.microsoft.com/office/powerpoint/2010/main" val="2323148503"/>
       </p:ext>
     </p:extLst>
   </p:cSld>
@@ -6322,657 +6308,6 @@
 </file>
 
 <file path=ppt/slides/slide11.xml><?xml version="1.0" encoding="utf-8"?>
-<p:sld xmlns:a="http://schemas.openxmlformats.org/drawingml/2006/main" xmlns:r="http://schemas.openxmlformats.org/officeDocument/2006/relationships" xmlns:p="http://schemas.openxmlformats.org/presentationml/2006/main">
-  <p:cSld>
-    <p:spTree>
-      <p:nvGrpSpPr>
-        <p:cNvPr id="1" name=""/>
-        <p:cNvGrpSpPr/>
-        <p:nvPr/>
-      </p:nvGrpSpPr>
-      <p:grpSpPr>
-        <a:xfrm>
-          <a:off x="0" y="0"/>
-          <a:ext cx="0" cy="0"/>
-          <a:chOff x="0" y="0"/>
-          <a:chExt cx="0" cy="0"/>
-        </a:xfrm>
-      </p:grpSpPr>
-      <p:sp>
-        <p:nvSpPr>
-          <p:cNvPr id="2" name="Title 1">
-            <a:extLst>
-              <a:ext uri="{FF2B5EF4-FFF2-40B4-BE49-F238E27FC236}">
-                <a16:creationId xmlns:a16="http://schemas.microsoft.com/office/drawing/2014/main" id="{1B2C3306-E796-445C-8153-D0994FEDCFCD}"/>
-              </a:ext>
-            </a:extLst>
-          </p:cNvPr>
-          <p:cNvSpPr>
-            <a:spLocks noGrp="1"/>
-          </p:cNvSpPr>
-          <p:nvPr>
-            <p:ph type="title"/>
-          </p:nvPr>
-        </p:nvSpPr>
-        <p:spPr/>
-        <p:txBody>
-          <a:bodyPr/>
-          <a:lstStyle/>
-          <a:p>
-            <a:r>
-              <a:rPr lang="en-US" dirty="0"/>
-              <a:t>Login Authentication - Completed</a:t>
-            </a:r>
-            <a:endParaRPr lang="en-GB" dirty="0"/>
-          </a:p>
-        </p:txBody>
-      </p:sp>
-      <p:sp>
-        <p:nvSpPr>
-          <p:cNvPr id="3" name="Text Placeholder 2">
-            <a:extLst>
-              <a:ext uri="{FF2B5EF4-FFF2-40B4-BE49-F238E27FC236}">
-                <a16:creationId xmlns:a16="http://schemas.microsoft.com/office/drawing/2014/main" id="{8BEF1ACF-AD1B-4F73-BA2D-E156AA1D775E}"/>
-              </a:ext>
-            </a:extLst>
-          </p:cNvPr>
-          <p:cNvSpPr>
-            <a:spLocks noGrp="1"/>
-          </p:cNvSpPr>
-          <p:nvPr>
-            <p:ph type="body" idx="1"/>
-          </p:nvPr>
-        </p:nvSpPr>
-        <p:spPr/>
-        <p:txBody>
-          <a:bodyPr/>
-          <a:lstStyle/>
-          <a:p>
-            <a:r>
-              <a:rPr lang="en-US" dirty="0"/>
-              <a:t>Signup Section</a:t>
-            </a:r>
-            <a:endParaRPr lang="en-GB" dirty="0"/>
-          </a:p>
-        </p:txBody>
-      </p:sp>
-      <p:pic>
-        <p:nvPicPr>
-          <p:cNvPr id="7" name="Content Placeholder 6">
-            <a:extLst>
-              <a:ext uri="{FF2B5EF4-FFF2-40B4-BE49-F238E27FC236}">
-                <a16:creationId xmlns:a16="http://schemas.microsoft.com/office/drawing/2014/main" id="{3F981EA4-CDCA-42B1-8AD8-E1671D04B532}"/>
-              </a:ext>
-            </a:extLst>
-          </p:cNvPr>
-          <p:cNvPicPr>
-            <a:picLocks noGrp="1" noChangeAspect="1"/>
-          </p:cNvPicPr>
-          <p:nvPr>
-            <p:ph sz="half" idx="2"/>
-          </p:nvPr>
-        </p:nvPicPr>
-        <p:blipFill>
-          <a:blip r:embed="rId2"/>
-          <a:stretch>
-            <a:fillRect/>
-          </a:stretch>
-        </p:blipFill>
-        <p:spPr>
-          <a:xfrm>
-            <a:off x="6674756" y="2663544"/>
-            <a:ext cx="2627720" cy="3741738"/>
-          </a:xfrm>
-          <a:prstGeom prst="rect">
-            <a:avLst/>
-          </a:prstGeom>
-        </p:spPr>
-      </p:pic>
-      <p:sp>
-        <p:nvSpPr>
-          <p:cNvPr id="5" name="Text Placeholder 4">
-            <a:extLst>
-              <a:ext uri="{FF2B5EF4-FFF2-40B4-BE49-F238E27FC236}">
-                <a16:creationId xmlns:a16="http://schemas.microsoft.com/office/drawing/2014/main" id="{3F857A28-C7BE-4C91-8322-255C9EA67570}"/>
-              </a:ext>
-            </a:extLst>
-          </p:cNvPr>
-          <p:cNvSpPr>
-            <a:spLocks noGrp="1"/>
-          </p:cNvSpPr>
-          <p:nvPr>
-            <p:ph type="body" sz="quarter" idx="3"/>
-          </p:nvPr>
-        </p:nvSpPr>
-        <p:spPr/>
-        <p:txBody>
-          <a:bodyPr/>
-          <a:lstStyle/>
-          <a:p>
-            <a:r>
-              <a:rPr lang="en-US" dirty="0"/>
-              <a:t>Login Section</a:t>
-            </a:r>
-            <a:endParaRPr lang="en-GB" dirty="0"/>
-          </a:p>
-        </p:txBody>
-      </p:sp>
-      <p:pic>
-        <p:nvPicPr>
-          <p:cNvPr id="8" name="Content Placeholder 7">
-            <a:extLst>
-              <a:ext uri="{FF2B5EF4-FFF2-40B4-BE49-F238E27FC236}">
-                <a16:creationId xmlns:a16="http://schemas.microsoft.com/office/drawing/2014/main" id="{3A562B99-DEF0-4DEB-8BDD-7F38603187BF}"/>
-              </a:ext>
-            </a:extLst>
-          </p:cNvPr>
-          <p:cNvPicPr>
-            <a:picLocks noGrp="1" noChangeAspect="1"/>
-          </p:cNvPicPr>
-          <p:nvPr>
-            <p:ph sz="quarter" idx="4"/>
-          </p:nvPr>
-        </p:nvPicPr>
-        <p:blipFill>
-          <a:blip r:embed="rId3"/>
-          <a:stretch>
-            <a:fillRect/>
-          </a:stretch>
-        </p:blipFill>
-        <p:spPr>
-          <a:xfrm>
-            <a:off x="1526666" y="2663544"/>
-            <a:ext cx="2725715" cy="3741738"/>
-          </a:xfrm>
-          <a:prstGeom prst="rect">
-            <a:avLst/>
-          </a:prstGeom>
-        </p:spPr>
-      </p:pic>
-    </p:spTree>
-    <p:extLst>
-      <p:ext uri="{BB962C8B-B14F-4D97-AF65-F5344CB8AC3E}">
-        <p14:creationId xmlns:p14="http://schemas.microsoft.com/office/powerpoint/2010/main" val="3587525830"/>
-      </p:ext>
-    </p:extLst>
-  </p:cSld>
-  <p:clrMapOvr>
-    <a:masterClrMapping/>
-  </p:clrMapOvr>
-</p:sld>
-</file>
-
-<file path=ppt/slides/slide12.xml><?xml version="1.0" encoding="utf-8"?>
-<p:sld xmlns:a="http://schemas.openxmlformats.org/drawingml/2006/main" xmlns:r="http://schemas.openxmlformats.org/officeDocument/2006/relationships" xmlns:p="http://schemas.openxmlformats.org/presentationml/2006/main">
-  <p:cSld>
-    <p:spTree>
-      <p:nvGrpSpPr>
-        <p:cNvPr id="1" name=""/>
-        <p:cNvGrpSpPr/>
-        <p:nvPr/>
-      </p:nvGrpSpPr>
-      <p:grpSpPr>
-        <a:xfrm>
-          <a:off x="0" y="0"/>
-          <a:ext cx="0" cy="0"/>
-          <a:chOff x="0" y="0"/>
-          <a:chExt cx="0" cy="0"/>
-        </a:xfrm>
-      </p:grpSpPr>
-      <p:sp>
-        <p:nvSpPr>
-          <p:cNvPr id="2" name="Title 1">
-            <a:extLst>
-              <a:ext uri="{FF2B5EF4-FFF2-40B4-BE49-F238E27FC236}">
-                <a16:creationId xmlns:a16="http://schemas.microsoft.com/office/drawing/2014/main" id="{4BE91FF0-6FF0-429B-907F-DD9D39A6DD9B}"/>
-              </a:ext>
-            </a:extLst>
-          </p:cNvPr>
-          <p:cNvSpPr>
-            <a:spLocks noGrp="1"/>
-          </p:cNvSpPr>
-          <p:nvPr>
-            <p:ph type="title"/>
-          </p:nvPr>
-        </p:nvSpPr>
-        <p:spPr>
-          <a:xfrm>
-            <a:off x="0" y="248532"/>
-            <a:ext cx="10306975" cy="1400530"/>
-          </a:xfrm>
-        </p:spPr>
-        <p:txBody>
-          <a:bodyPr/>
-          <a:lstStyle/>
-          <a:p>
-            <a:r>
-              <a:rPr lang="en-US" dirty="0" err="1"/>
-              <a:t>Communnity</a:t>
-            </a:r>
-            <a:r>
-              <a:rPr lang="en-US" dirty="0"/>
-              <a:t> Events – </a:t>
-            </a:r>
-            <a:r>
-              <a:rPr lang="en-US" sz="3600" dirty="0"/>
-              <a:t>Frontend Completed</a:t>
-            </a:r>
-            <a:endParaRPr lang="en-GB" dirty="0"/>
-          </a:p>
-        </p:txBody>
-      </p:sp>
-      <p:pic>
-        <p:nvPicPr>
-          <p:cNvPr id="4" name="Content Placeholder 3">
-            <a:extLst>
-              <a:ext uri="{FF2B5EF4-FFF2-40B4-BE49-F238E27FC236}">
-                <a16:creationId xmlns:a16="http://schemas.microsoft.com/office/drawing/2014/main" id="{99D75150-AEC5-4A07-8D0F-030902174F47}"/>
-              </a:ext>
-            </a:extLst>
-          </p:cNvPr>
-          <p:cNvPicPr>
-            <a:picLocks noGrp="1" noChangeAspect="1"/>
-          </p:cNvPicPr>
-          <p:nvPr>
-            <p:ph idx="1"/>
-          </p:nvPr>
-        </p:nvPicPr>
-        <p:blipFill>
-          <a:blip r:embed="rId2"/>
-          <a:stretch>
-            <a:fillRect/>
-          </a:stretch>
-        </p:blipFill>
-        <p:spPr>
-          <a:xfrm>
-            <a:off x="1229232" y="2105904"/>
-            <a:ext cx="8238479" cy="4195762"/>
-          </a:xfrm>
-          <a:prstGeom prst="rect">
-            <a:avLst/>
-          </a:prstGeom>
-        </p:spPr>
-      </p:pic>
-    </p:spTree>
-    <p:extLst>
-      <p:ext uri="{BB962C8B-B14F-4D97-AF65-F5344CB8AC3E}">
-        <p14:creationId xmlns:p14="http://schemas.microsoft.com/office/powerpoint/2010/main" val="3927947955"/>
-      </p:ext>
-    </p:extLst>
-  </p:cSld>
-  <p:clrMapOvr>
-    <a:masterClrMapping/>
-  </p:clrMapOvr>
-</p:sld>
-</file>
-
-<file path=ppt/slides/slide13.xml><?xml version="1.0" encoding="utf-8"?>
-<p:sld xmlns:a="http://schemas.openxmlformats.org/drawingml/2006/main" xmlns:r="http://schemas.openxmlformats.org/officeDocument/2006/relationships" xmlns:p="http://schemas.openxmlformats.org/presentationml/2006/main">
-  <p:cSld>
-    <p:spTree>
-      <p:nvGrpSpPr>
-        <p:cNvPr id="1" name=""/>
-        <p:cNvGrpSpPr/>
-        <p:nvPr/>
-      </p:nvGrpSpPr>
-      <p:grpSpPr>
-        <a:xfrm>
-          <a:off x="0" y="0"/>
-          <a:ext cx="0" cy="0"/>
-          <a:chOff x="0" y="0"/>
-          <a:chExt cx="0" cy="0"/>
-        </a:xfrm>
-      </p:grpSpPr>
-      <p:sp>
-        <p:nvSpPr>
-          <p:cNvPr id="2" name="Title 1">
-            <a:extLst>
-              <a:ext uri="{FF2B5EF4-FFF2-40B4-BE49-F238E27FC236}">
-                <a16:creationId xmlns:a16="http://schemas.microsoft.com/office/drawing/2014/main" id="{4BE91FF0-6FF0-429B-907F-DD9D39A6DD9B}"/>
-              </a:ext>
-            </a:extLst>
-          </p:cNvPr>
-          <p:cNvSpPr>
-            <a:spLocks noGrp="1"/>
-          </p:cNvSpPr>
-          <p:nvPr>
-            <p:ph type="title"/>
-          </p:nvPr>
-        </p:nvSpPr>
-        <p:spPr>
-          <a:xfrm>
-            <a:off x="0" y="248532"/>
-            <a:ext cx="10306975" cy="1400530"/>
-          </a:xfrm>
-        </p:spPr>
-        <p:txBody>
-          <a:bodyPr/>
-          <a:lstStyle/>
-          <a:p>
-            <a:r>
-              <a:rPr lang="en-US" dirty="0"/>
-              <a:t>User Dashboard – Frontend </a:t>
-            </a:r>
-            <a:endParaRPr lang="en-GB" dirty="0"/>
-          </a:p>
-        </p:txBody>
-      </p:sp>
-      <p:sp>
-        <p:nvSpPr>
-          <p:cNvPr id="5" name="Content Placeholder 4">
-            <a:extLst>
-              <a:ext uri="{FF2B5EF4-FFF2-40B4-BE49-F238E27FC236}">
-                <a16:creationId xmlns:a16="http://schemas.microsoft.com/office/drawing/2014/main" id="{164175FD-08AF-4A0D-8F19-307F131B815F}"/>
-              </a:ext>
-            </a:extLst>
-          </p:cNvPr>
-          <p:cNvSpPr>
-            <a:spLocks noGrp="1"/>
-          </p:cNvSpPr>
-          <p:nvPr>
-            <p:ph idx="1"/>
-          </p:nvPr>
-        </p:nvSpPr>
-        <p:spPr/>
-        <p:txBody>
-          <a:bodyPr/>
-          <a:lstStyle/>
-          <a:p>
-            <a:endParaRPr lang="en-GB"/>
-          </a:p>
-        </p:txBody>
-      </p:sp>
-      <p:pic>
-        <p:nvPicPr>
-          <p:cNvPr id="6" name="Picture 5">
-            <a:extLst>
-              <a:ext uri="{FF2B5EF4-FFF2-40B4-BE49-F238E27FC236}">
-                <a16:creationId xmlns:a16="http://schemas.microsoft.com/office/drawing/2014/main" id="{6086AF55-CD92-4DFC-9802-341D167349E3}"/>
-              </a:ext>
-            </a:extLst>
-          </p:cNvPr>
-          <p:cNvPicPr>
-            <a:picLocks noChangeAspect="1"/>
-          </p:cNvPicPr>
-          <p:nvPr/>
-        </p:nvPicPr>
-        <p:blipFill>
-          <a:blip r:embed="rId2"/>
-          <a:stretch>
-            <a:fillRect/>
-          </a:stretch>
-        </p:blipFill>
-        <p:spPr>
-          <a:xfrm>
-            <a:off x="488272" y="1171852"/>
-            <a:ext cx="10955523" cy="5295573"/>
-          </a:xfrm>
-          <a:prstGeom prst="rect">
-            <a:avLst/>
-          </a:prstGeom>
-        </p:spPr>
-      </p:pic>
-    </p:spTree>
-    <p:extLst>
-      <p:ext uri="{BB962C8B-B14F-4D97-AF65-F5344CB8AC3E}">
-        <p14:creationId xmlns:p14="http://schemas.microsoft.com/office/powerpoint/2010/main" val="2289028685"/>
-      </p:ext>
-    </p:extLst>
-  </p:cSld>
-  <p:clrMapOvr>
-    <a:masterClrMapping/>
-  </p:clrMapOvr>
-</p:sld>
-</file>
-
-<file path=ppt/slides/slide14.xml><?xml version="1.0" encoding="utf-8"?>
-<p:sld xmlns:a="http://schemas.openxmlformats.org/drawingml/2006/main" xmlns:r="http://schemas.openxmlformats.org/officeDocument/2006/relationships" xmlns:p="http://schemas.openxmlformats.org/presentationml/2006/main">
-  <p:cSld>
-    <p:spTree>
-      <p:nvGrpSpPr>
-        <p:cNvPr id="1" name=""/>
-        <p:cNvGrpSpPr/>
-        <p:nvPr/>
-      </p:nvGrpSpPr>
-      <p:grpSpPr>
-        <a:xfrm>
-          <a:off x="0" y="0"/>
-          <a:ext cx="0" cy="0"/>
-          <a:chOff x="0" y="0"/>
-          <a:chExt cx="0" cy="0"/>
-        </a:xfrm>
-      </p:grpSpPr>
-      <p:sp>
-        <p:nvSpPr>
-          <p:cNvPr id="2" name="Title 1">
-            <a:extLst>
-              <a:ext uri="{FF2B5EF4-FFF2-40B4-BE49-F238E27FC236}">
-                <a16:creationId xmlns:a16="http://schemas.microsoft.com/office/drawing/2014/main" id="{5CF210CF-698F-415A-9A05-68B318BE181B}"/>
-              </a:ext>
-            </a:extLst>
-          </p:cNvPr>
-          <p:cNvSpPr>
-            <a:spLocks noGrp="1"/>
-          </p:cNvSpPr>
-          <p:nvPr>
-            <p:ph type="title"/>
-          </p:nvPr>
-        </p:nvSpPr>
-        <p:spPr/>
-        <p:txBody>
-          <a:bodyPr/>
-          <a:lstStyle/>
-          <a:p>
-            <a:r>
-              <a:rPr lang="en-US" dirty="0"/>
-              <a:t>Login Problem Faced</a:t>
-            </a:r>
-            <a:endParaRPr lang="en-GB" dirty="0"/>
-          </a:p>
-        </p:txBody>
-      </p:sp>
-      <p:sp>
-        <p:nvSpPr>
-          <p:cNvPr id="3" name="Text Placeholder 2">
-            <a:extLst>
-              <a:ext uri="{FF2B5EF4-FFF2-40B4-BE49-F238E27FC236}">
-                <a16:creationId xmlns:a16="http://schemas.microsoft.com/office/drawing/2014/main" id="{5A6555A4-88F4-41F3-A188-11296D4EDC40}"/>
-              </a:ext>
-            </a:extLst>
-          </p:cNvPr>
-          <p:cNvSpPr>
-            <a:spLocks noGrp="1"/>
-          </p:cNvSpPr>
-          <p:nvPr>
-            <p:ph type="body" idx="1"/>
-          </p:nvPr>
-        </p:nvSpPr>
-        <p:spPr>
-          <a:xfrm>
-            <a:off x="1103313" y="1221010"/>
-            <a:ext cx="4396338" cy="1398032"/>
-          </a:xfrm>
-        </p:spPr>
-        <p:txBody>
-          <a:bodyPr/>
-          <a:lstStyle/>
-          <a:p>
-            <a:r>
-              <a:rPr lang="en-US" dirty="0"/>
-              <a:t>MODAL DESIGN ISSUES</a:t>
-            </a:r>
-            <a:endParaRPr lang="en-GB" dirty="0"/>
-          </a:p>
-          <a:p>
-            <a:endParaRPr lang="en-GB" dirty="0"/>
-          </a:p>
-        </p:txBody>
-      </p:sp>
-      <p:sp>
-        <p:nvSpPr>
-          <p:cNvPr id="4" name="Content Placeholder 3">
-            <a:extLst>
-              <a:ext uri="{FF2B5EF4-FFF2-40B4-BE49-F238E27FC236}">
-                <a16:creationId xmlns:a16="http://schemas.microsoft.com/office/drawing/2014/main" id="{CD75FCBA-0EB1-468C-9204-12D1E8574A51}"/>
-              </a:ext>
-            </a:extLst>
-          </p:cNvPr>
-          <p:cNvSpPr>
-            <a:spLocks noGrp="1"/>
-          </p:cNvSpPr>
-          <p:nvPr>
-            <p:ph sz="half" idx="2"/>
-          </p:nvPr>
-        </p:nvSpPr>
-        <p:spPr/>
-        <p:txBody>
-          <a:bodyPr/>
-          <a:lstStyle/>
-          <a:p>
-            <a:endParaRPr lang="en-GB" dirty="0"/>
-          </a:p>
-        </p:txBody>
-      </p:sp>
-      <p:pic>
-        <p:nvPicPr>
-          <p:cNvPr id="10" name="Content Placeholder 9">
-            <a:extLst>
-              <a:ext uri="{FF2B5EF4-FFF2-40B4-BE49-F238E27FC236}">
-                <a16:creationId xmlns:a16="http://schemas.microsoft.com/office/drawing/2014/main" id="{4BBDA0C6-0C3E-487C-86FB-3286A2AB5252}"/>
-              </a:ext>
-            </a:extLst>
-          </p:cNvPr>
-          <p:cNvPicPr>
-            <a:picLocks noGrp="1" noChangeAspect="1"/>
-          </p:cNvPicPr>
-          <p:nvPr>
-            <p:ph sz="quarter" idx="4"/>
-          </p:nvPr>
-        </p:nvPicPr>
-        <p:blipFill>
-          <a:blip r:embed="rId2"/>
-          <a:stretch>
-            <a:fillRect/>
-          </a:stretch>
-        </p:blipFill>
-        <p:spPr>
-          <a:xfrm>
-            <a:off x="1103312" y="2619042"/>
-            <a:ext cx="4395788" cy="3017948"/>
-          </a:xfrm>
-          <a:prstGeom prst="rect">
-            <a:avLst/>
-          </a:prstGeom>
-        </p:spPr>
-      </p:pic>
-      <p:sp>
-        <p:nvSpPr>
-          <p:cNvPr id="12" name="Text Placeholder 11">
-            <a:extLst>
-              <a:ext uri="{FF2B5EF4-FFF2-40B4-BE49-F238E27FC236}">
-                <a16:creationId xmlns:a16="http://schemas.microsoft.com/office/drawing/2014/main" id="{53BFE0C9-B326-4000-A40D-88062BF3ECD2}"/>
-              </a:ext>
-            </a:extLst>
-          </p:cNvPr>
-          <p:cNvSpPr>
-            <a:spLocks noGrp="1"/>
-          </p:cNvSpPr>
-          <p:nvPr>
-            <p:ph type="body" sz="quarter" idx="3"/>
-          </p:nvPr>
-        </p:nvSpPr>
-        <p:spPr>
-          <a:xfrm>
-            <a:off x="5654495" y="1080732"/>
-            <a:ext cx="5034220" cy="1400530"/>
-          </a:xfrm>
-        </p:spPr>
-        <p:txBody>
-          <a:bodyPr/>
-          <a:lstStyle/>
-          <a:p>
-            <a:r>
-              <a:rPr lang="en-US" dirty="0"/>
-              <a:t>Solved by creating separate page for signup and login rather than creating on same page</a:t>
-            </a:r>
-            <a:endParaRPr lang="en-GB" dirty="0"/>
-          </a:p>
-        </p:txBody>
-      </p:sp>
-      <p:pic>
-        <p:nvPicPr>
-          <p:cNvPr id="14" name="Content Placeholder 7">
-            <a:extLst>
-              <a:ext uri="{FF2B5EF4-FFF2-40B4-BE49-F238E27FC236}">
-                <a16:creationId xmlns:a16="http://schemas.microsoft.com/office/drawing/2014/main" id="{5EB28A44-1768-499B-ACF4-249866BE0048}"/>
-              </a:ext>
-            </a:extLst>
-          </p:cNvPr>
-          <p:cNvPicPr>
-            <a:picLocks noChangeAspect="1"/>
-          </p:cNvPicPr>
-          <p:nvPr/>
-        </p:nvPicPr>
-        <p:blipFill>
-          <a:blip r:embed="rId3"/>
-          <a:stretch>
-            <a:fillRect/>
-          </a:stretch>
-        </p:blipFill>
-        <p:spPr>
-          <a:xfrm>
-            <a:off x="6187443" y="2619042"/>
-            <a:ext cx="2725715" cy="3741738"/>
-          </a:xfrm>
-          <a:prstGeom prst="rect">
-            <a:avLst/>
-          </a:prstGeom>
-        </p:spPr>
-      </p:pic>
-      <p:pic>
-        <p:nvPicPr>
-          <p:cNvPr id="15" name="Content Placeholder 6">
-            <a:extLst>
-              <a:ext uri="{FF2B5EF4-FFF2-40B4-BE49-F238E27FC236}">
-                <a16:creationId xmlns:a16="http://schemas.microsoft.com/office/drawing/2014/main" id="{BCC1CF15-3BBA-4810-80D3-2323C72FBF63}"/>
-              </a:ext>
-            </a:extLst>
-          </p:cNvPr>
-          <p:cNvPicPr>
-            <a:picLocks noChangeAspect="1"/>
-          </p:cNvPicPr>
-          <p:nvPr/>
-        </p:nvPicPr>
-        <p:blipFill>
-          <a:blip r:embed="rId4"/>
-          <a:stretch>
-            <a:fillRect/>
-          </a:stretch>
-        </p:blipFill>
-        <p:spPr>
-          <a:xfrm>
-            <a:off x="9284791" y="2619042"/>
-            <a:ext cx="2627720" cy="3741738"/>
-          </a:xfrm>
-          <a:prstGeom prst="rect">
-            <a:avLst/>
-          </a:prstGeom>
-        </p:spPr>
-      </p:pic>
-    </p:spTree>
-    <p:extLst>
-      <p:ext uri="{BB962C8B-B14F-4D97-AF65-F5344CB8AC3E}">
-        <p14:creationId xmlns:p14="http://schemas.microsoft.com/office/powerpoint/2010/main" val="2403334419"/>
-      </p:ext>
-    </p:extLst>
-  </p:cSld>
-  <p:clrMapOvr>
-    <a:masterClrMapping/>
-  </p:clrMapOvr>
-</p:sld>
-</file>
-
-<file path=ppt/slides/slide15.xml><?xml version="1.0" encoding="utf-8"?>
 <p:sld xmlns:a="http://schemas.openxmlformats.org/drawingml/2006/main" xmlns:r="http://schemas.openxmlformats.org/officeDocument/2006/relationships" xmlns:p="http://schemas.openxmlformats.org/presentationml/2006/main">
   <p:cSld>
     <p:spTree>
@@ -7158,7 +6493,7 @@
 </p:sld>
 </file>
 
-<file path=ppt/slides/slide16.xml><?xml version="1.0" encoding="utf-8"?>
+<file path=ppt/slides/slide12.xml><?xml version="1.0" encoding="utf-8"?>
 <p:sld xmlns:a="http://schemas.openxmlformats.org/drawingml/2006/main" xmlns:r="http://schemas.openxmlformats.org/officeDocument/2006/relationships" xmlns:p="http://schemas.openxmlformats.org/presentationml/2006/main">
   <p:cSld>
     <p:spTree>
@@ -7357,7 +6692,7 @@
 </p:sld>
 </file>
 
-<file path=ppt/slides/slide17.xml><?xml version="1.0" encoding="utf-8"?>
+<file path=ppt/slides/slide13.xml><?xml version="1.0" encoding="utf-8"?>
 <p:sld xmlns:a="http://schemas.openxmlformats.org/drawingml/2006/main" xmlns:r="http://schemas.openxmlformats.org/officeDocument/2006/relationships" xmlns:p="http://schemas.openxmlformats.org/presentationml/2006/main">
   <p:cSld>
     <p:spTree>
@@ -7709,7 +7044,7 @@
 </p:sld>
 </file>
 
-<file path=ppt/slides/slide18.xml><?xml version="1.0" encoding="utf-8"?>
+<file path=ppt/slides/slide14.xml><?xml version="1.0" encoding="utf-8"?>
 <p:sld xmlns:a="http://schemas.openxmlformats.org/drawingml/2006/main" xmlns:r="http://schemas.openxmlformats.org/officeDocument/2006/relationships" xmlns:p="http://schemas.openxmlformats.org/presentationml/2006/main">
   <p:cSld>
     <p:spTree>
@@ -7728,10 +7063,10 @@
       </p:grpSpPr>
       <p:sp>
         <p:nvSpPr>
-          <p:cNvPr id="2" name="Title 1">
+          <p:cNvPr id="5" name="Text Placeholder 4">
             <a:extLst>
               <a:ext uri="{FF2B5EF4-FFF2-40B4-BE49-F238E27FC236}">
-                <a16:creationId xmlns:a16="http://schemas.microsoft.com/office/drawing/2014/main" id="{5AAB587B-FAFD-491B-9A08-5389C8D37956}"/>
+                <a16:creationId xmlns:a16="http://schemas.microsoft.com/office/drawing/2014/main" id="{767E796E-E675-41A5-C3B3-568716C787DA}"/>
               </a:ext>
             </a:extLst>
           </p:cNvPr>
@@ -7739,61 +7074,31 @@
             <a:spLocks noGrp="1"/>
           </p:cNvSpPr>
           <p:nvPr>
-            <p:ph type="title"/>
-          </p:nvPr>
-        </p:nvSpPr>
-        <p:spPr/>
-        <p:txBody>
-          <a:bodyPr/>
-          <a:lstStyle/>
-          <a:p>
-            <a:r>
-              <a:rPr lang="en-US" dirty="0"/>
-              <a:t>More to go</a:t>
-            </a:r>
-            <a:endParaRPr lang="en-GB" dirty="0"/>
-          </a:p>
-        </p:txBody>
-      </p:sp>
-      <p:sp>
-        <p:nvSpPr>
-          <p:cNvPr id="3" name="Content Placeholder 2">
-            <a:extLst>
-              <a:ext uri="{FF2B5EF4-FFF2-40B4-BE49-F238E27FC236}">
-                <a16:creationId xmlns:a16="http://schemas.microsoft.com/office/drawing/2014/main" id="{5F7BD450-5A60-40C5-A605-B8B633C88B11}"/>
-              </a:ext>
-            </a:extLst>
-          </p:cNvPr>
-          <p:cNvSpPr>
-            <a:spLocks noGrp="1"/>
-          </p:cNvSpPr>
-          <p:nvPr>
-            <p:ph idx="1"/>
-          </p:nvPr>
-        </p:nvSpPr>
-        <p:spPr/>
-        <p:txBody>
-          <a:bodyPr/>
-          <a:lstStyle/>
-          <a:p>
-            <a:r>
-              <a:rPr lang="en-US" dirty="0"/>
-              <a:t>Payment Gateway</a:t>
-            </a:r>
-          </a:p>
-          <a:p>
-            <a:r>
-              <a:rPr lang="en-US" dirty="0"/>
-              <a:t>Functionality for Freelancer and User</a:t>
-            </a:r>
-            <a:endParaRPr lang="en-GB" dirty="0"/>
+            <p:ph type="body" sz="quarter" idx="3"/>
+          </p:nvPr>
+        </p:nvSpPr>
+        <p:spPr>
+          <a:xfrm>
+            <a:off x="1990165" y="3012141"/>
+            <a:ext cx="7055224" cy="576262"/>
+          </a:xfrm>
+        </p:spPr>
+        <p:txBody>
+          <a:bodyPr/>
+          <a:lstStyle/>
+          <a:p>
+            <a:pPr algn="ctr"/>
+            <a:r>
+              <a:rPr lang="en-US" sz="5400" dirty="0"/>
+              <a:t>Thank You!</a:t>
+            </a:r>
           </a:p>
         </p:txBody>
       </p:sp>
     </p:spTree>
     <p:extLst>
       <p:ext uri="{BB962C8B-B14F-4D97-AF65-F5344CB8AC3E}">
-        <p14:creationId xmlns:p14="http://schemas.microsoft.com/office/powerpoint/2010/main" val="1399475104"/>
+        <p14:creationId xmlns:p14="http://schemas.microsoft.com/office/powerpoint/2010/main" val="3334244565"/>
       </p:ext>
     </p:extLst>
   </p:cSld>
@@ -8020,295 +7325,6 @@
           <p:cNvPr id="2" name="Title 1">
             <a:extLst>
               <a:ext uri="{FF2B5EF4-FFF2-40B4-BE49-F238E27FC236}">
-                <a16:creationId xmlns:a16="http://schemas.microsoft.com/office/drawing/2014/main" id="{32CE7AEE-5AFC-4D09-A88D-2B8FD2CCE567}"/>
-              </a:ext>
-            </a:extLst>
-          </p:cNvPr>
-          <p:cNvSpPr>
-            <a:spLocks noGrp="1"/>
-          </p:cNvSpPr>
-          <p:nvPr>
-            <p:ph type="title"/>
-          </p:nvPr>
-        </p:nvSpPr>
-        <p:spPr/>
-        <p:txBody>
-          <a:bodyPr/>
-          <a:lstStyle/>
-          <a:p>
-            <a:r>
-              <a:rPr lang="en-US" b="1" u="sng" dirty="0"/>
-              <a:t>Problem Statement</a:t>
-            </a:r>
-            <a:endParaRPr lang="en-GB" b="1" u="sng" dirty="0"/>
-          </a:p>
-        </p:txBody>
-      </p:sp>
-      <p:sp>
-        <p:nvSpPr>
-          <p:cNvPr id="3" name="Content Placeholder 2">
-            <a:extLst>
-              <a:ext uri="{FF2B5EF4-FFF2-40B4-BE49-F238E27FC236}">
-                <a16:creationId xmlns:a16="http://schemas.microsoft.com/office/drawing/2014/main" id="{760F9F86-4C68-45D0-9D70-70007A55F948}"/>
-              </a:ext>
-            </a:extLst>
-          </p:cNvPr>
-          <p:cNvSpPr>
-            <a:spLocks noGrp="1"/>
-          </p:cNvSpPr>
-          <p:nvPr>
-            <p:ph idx="1"/>
-          </p:nvPr>
-        </p:nvSpPr>
-        <p:spPr/>
-        <p:txBody>
-          <a:bodyPr/>
-          <a:lstStyle/>
-          <a:p>
-            <a:pPr marL="0" lvl="0" indent="0" defTabSz="914400" eaLnBrk="0" fontAlgn="base" hangingPunct="0">
-              <a:spcBef>
-                <a:spcPct val="0"/>
-              </a:spcBef>
-              <a:spcAft>
-                <a:spcPct val="0"/>
-              </a:spcAft>
-              <a:buClrTx/>
-              <a:buSzTx/>
-              <a:buFontTx/>
-              <a:buChar char="•"/>
-            </a:pPr>
-            <a:r>
-              <a:rPr lang="en-US" altLang="en-US" b="1" dirty="0">
-                <a:latin typeface="Century Gothic (Headings)"/>
-              </a:rPr>
-              <a:t>Lack of Nepali Payment Gateways:</a:t>
-            </a:r>
-            <a:r>
-              <a:rPr lang="en-US" altLang="en-US" dirty="0">
-                <a:latin typeface="Century Gothic (Headings)"/>
-              </a:rPr>
-              <a:t> </a:t>
-            </a:r>
-          </a:p>
-          <a:p>
-            <a:pPr marL="0" lvl="0" indent="0" defTabSz="914400" eaLnBrk="0" fontAlgn="base" hangingPunct="0">
-              <a:spcBef>
-                <a:spcPct val="0"/>
-              </a:spcBef>
-              <a:spcAft>
-                <a:spcPct val="0"/>
-              </a:spcAft>
-              <a:buClrTx/>
-              <a:buSzTx/>
-              <a:buNone/>
-            </a:pPr>
-            <a:r>
-              <a:rPr lang="en-US" altLang="en-US" dirty="0">
-                <a:latin typeface="Century Gothic (Headings)"/>
-              </a:rPr>
-              <a:t>The absence of integration with popular Nepali payment gateways like </a:t>
-            </a:r>
-            <a:r>
-              <a:rPr lang="en-US" altLang="en-US" dirty="0" err="1">
-                <a:latin typeface="Century Gothic (Headings)"/>
-              </a:rPr>
-              <a:t>Khalti</a:t>
-            </a:r>
-            <a:r>
-              <a:rPr lang="en-US" altLang="en-US" dirty="0">
-                <a:latin typeface="Century Gothic (Headings)"/>
-              </a:rPr>
-              <a:t> and </a:t>
-            </a:r>
-            <a:r>
-              <a:rPr lang="en-US" altLang="en-US" dirty="0" err="1">
-                <a:latin typeface="Century Gothic (Headings)"/>
-              </a:rPr>
-              <a:t>eSewa</a:t>
-            </a:r>
-            <a:r>
-              <a:rPr lang="en-US" altLang="en-US" dirty="0">
-                <a:latin typeface="Century Gothic (Headings)"/>
-              </a:rPr>
-              <a:t> limits the ease of transactions for local freelancers and clients, creating barriers to efficient payments within the domestic market.</a:t>
-            </a:r>
-          </a:p>
-          <a:p>
-            <a:pPr marL="0" lvl="0" indent="0" defTabSz="914400" eaLnBrk="0" fontAlgn="base" hangingPunct="0">
-              <a:spcBef>
-                <a:spcPct val="0"/>
-              </a:spcBef>
-              <a:spcAft>
-                <a:spcPct val="0"/>
-              </a:spcAft>
-              <a:buClrTx/>
-              <a:buSzTx/>
-              <a:buFontTx/>
-              <a:buChar char="•"/>
-            </a:pPr>
-            <a:endParaRPr lang="en-US" altLang="en-US" dirty="0">
-              <a:latin typeface="Century Gothic (Headings)"/>
-            </a:endParaRPr>
-          </a:p>
-          <a:p>
-            <a:pPr marL="0" lvl="0" indent="0" defTabSz="914400" eaLnBrk="0" fontAlgn="base" hangingPunct="0">
-              <a:spcBef>
-                <a:spcPct val="0"/>
-              </a:spcBef>
-              <a:spcAft>
-                <a:spcPct val="0"/>
-              </a:spcAft>
-              <a:buClrTx/>
-              <a:buSzTx/>
-              <a:buFontTx/>
-              <a:buChar char="•"/>
-            </a:pPr>
-            <a:r>
-              <a:rPr lang="en-US" altLang="en-US" b="1" dirty="0">
-                <a:latin typeface="Century Gothic (Headings)"/>
-              </a:rPr>
-              <a:t>Limited Local Freelance Marketplaces:</a:t>
-            </a:r>
-            <a:r>
-              <a:rPr lang="en-US" altLang="en-US" dirty="0">
-                <a:latin typeface="Century Gothic (Headings)"/>
-              </a:rPr>
-              <a:t> The scarcity of dedicated freelance platforms catering specifically to the Nepali market restricts opportunities for local talent and businesses, forcing them to rely on global platforms that may not address region-specific needs.</a:t>
-            </a:r>
-          </a:p>
-          <a:p>
-            <a:endParaRPr lang="en-GB" dirty="0">
-              <a:latin typeface="Century Gothic (Headings)"/>
-            </a:endParaRPr>
-          </a:p>
-        </p:txBody>
-      </p:sp>
-    </p:spTree>
-    <p:extLst>
-      <p:ext uri="{BB962C8B-B14F-4D97-AF65-F5344CB8AC3E}">
-        <p14:creationId xmlns:p14="http://schemas.microsoft.com/office/powerpoint/2010/main" val="961392657"/>
-      </p:ext>
-    </p:extLst>
-  </p:cSld>
-  <p:clrMapOvr>
-    <a:masterClrMapping/>
-  </p:clrMapOvr>
-  <p:timing>
-    <p:tnLst>
-      <p:par>
-        <p:cTn id="1" dur="indefinite" restart="never" nodeType="tmRoot">
-          <p:childTnLst>
-            <p:seq concurrent="1" nextAc="seek">
-              <p:cTn id="2" dur="indefinite" nodeType="mainSeq">
-                <p:childTnLst>
-                  <p:par>
-                    <p:cTn id="3" fill="hold">
-                      <p:stCondLst>
-                        <p:cond delay="indefinite"/>
-                      </p:stCondLst>
-                      <p:childTnLst>
-                        <p:par>
-                          <p:cTn id="4" fill="hold">
-                            <p:stCondLst>
-                              <p:cond delay="0"/>
-                            </p:stCondLst>
-                            <p:childTnLst>
-                              <p:par>
-                                <p:cTn id="5" presetID="10" presetClass="entr" presetSubtype="0" fill="hold" nodeType="clickEffect">
-                                  <p:stCondLst>
-                                    <p:cond delay="0"/>
-                                  </p:stCondLst>
-                                  <p:childTnLst>
-                                    <p:set>
-                                      <p:cBhvr>
-                                        <p:cTn id="6" dur="1" fill="hold">
-                                          <p:stCondLst>
-                                            <p:cond delay="0"/>
-                                          </p:stCondLst>
-                                        </p:cTn>
-                                        <p:tgtEl>
-                                          <p:spTgt spid="3">
-                                            <p:txEl>
-                                              <p:pRg st="3" end="3"/>
-                                            </p:txEl>
-                                          </p:spTgt>
-                                        </p:tgtEl>
-                                        <p:attrNameLst>
-                                          <p:attrName>style.visibility</p:attrName>
-                                        </p:attrNameLst>
-                                      </p:cBhvr>
-                                      <p:to>
-                                        <p:strVal val="visible"/>
-                                      </p:to>
-                                    </p:set>
-                                    <p:animEffect transition="in" filter="fade">
-                                      <p:cBhvr>
-                                        <p:cTn id="7" dur="500"/>
-                                        <p:tgtEl>
-                                          <p:spTgt spid="3">
-                                            <p:txEl>
-                                              <p:pRg st="3" end="3"/>
-                                            </p:txEl>
-                                          </p:spTgt>
-                                        </p:tgtEl>
-                                      </p:cBhvr>
-                                    </p:animEffect>
-                                  </p:childTnLst>
-                                </p:cTn>
-                              </p:par>
-                            </p:childTnLst>
-                          </p:cTn>
-                        </p:par>
-                      </p:childTnLst>
-                    </p:cTn>
-                  </p:par>
-                </p:childTnLst>
-              </p:cTn>
-              <p:prevCondLst>
-                <p:cond evt="onPrev" delay="0">
-                  <p:tgtEl>
-                    <p:sldTgt/>
-                  </p:tgtEl>
-                </p:cond>
-              </p:prevCondLst>
-              <p:nextCondLst>
-                <p:cond evt="onNext" delay="0">
-                  <p:tgtEl>
-                    <p:sldTgt/>
-                  </p:tgtEl>
-                </p:cond>
-              </p:nextCondLst>
-            </p:seq>
-          </p:childTnLst>
-        </p:cTn>
-      </p:par>
-    </p:tnLst>
-  </p:timing>
-</p:sld>
-</file>
-
-<file path=ppt/slides/slide4.xml><?xml version="1.0" encoding="utf-8"?>
-<p:sld xmlns:a="http://schemas.openxmlformats.org/drawingml/2006/main" xmlns:r="http://schemas.openxmlformats.org/officeDocument/2006/relationships" xmlns:p="http://schemas.openxmlformats.org/presentationml/2006/main">
-  <p:cSld>
-    <p:spTree>
-      <p:nvGrpSpPr>
-        <p:cNvPr id="1" name=""/>
-        <p:cNvGrpSpPr/>
-        <p:nvPr/>
-      </p:nvGrpSpPr>
-      <p:grpSpPr>
-        <a:xfrm>
-          <a:off x="0" y="0"/>
-          <a:ext cx="0" cy="0"/>
-          <a:chOff x="0" y="0"/>
-          <a:chExt cx="0" cy="0"/>
-        </a:xfrm>
-      </p:grpSpPr>
-      <p:sp>
-        <p:nvSpPr>
-          <p:cNvPr id="2" name="Title 1">
-            <a:extLst>
-              <a:ext uri="{FF2B5EF4-FFF2-40B4-BE49-F238E27FC236}">
                 <a16:creationId xmlns:a16="http://schemas.microsoft.com/office/drawing/2014/main" id="{684BE3D1-493E-4BF3-9CB6-8F4F655359E0}"/>
               </a:ext>
             </a:extLst>
@@ -8356,7 +7372,13 @@
           <a:p>
             <a:r>
               <a:rPr lang="en-US" dirty="0"/>
-              <a:t>To implement the reliable local payment gateways.</a:t>
+              <a:t>To implement the reliable payment gateways.</a:t>
+            </a:r>
+          </a:p>
+          <a:p>
+            <a:r>
+              <a:rPr lang="en-US" dirty="0"/>
+              <a:t>Improve the existing UI.</a:t>
             </a:r>
           </a:p>
         </p:txBody>
@@ -8374,7 +7396,7 @@
 </p:sld>
 </file>
 
-<file path=ppt/slides/slide5.xml><?xml version="1.0" encoding="utf-8"?>
+<file path=ppt/slides/slide4.xml><?xml version="1.0" encoding="utf-8"?>
 <p:sld xmlns:a="http://schemas.openxmlformats.org/drawingml/2006/main" xmlns:r="http://schemas.openxmlformats.org/officeDocument/2006/relationships" xmlns:p="http://schemas.openxmlformats.org/presentationml/2006/main">
   <p:cSld>
     <p:spTree>
@@ -8522,6 +7544,244 @@
 </p:sld>
 </file>
 
+<file path=ppt/slides/slide5.xml><?xml version="1.0" encoding="utf-8"?>
+<p:sld xmlns:a="http://schemas.openxmlformats.org/drawingml/2006/main" xmlns:r="http://schemas.openxmlformats.org/officeDocument/2006/relationships" xmlns:p="http://schemas.openxmlformats.org/presentationml/2006/main">
+  <p:cSld>
+    <p:spTree>
+      <p:nvGrpSpPr>
+        <p:cNvPr id="1" name="">
+          <a:extLst>
+            <a:ext uri="{FF2B5EF4-FFF2-40B4-BE49-F238E27FC236}">
+              <a16:creationId xmlns:a16="http://schemas.microsoft.com/office/drawing/2014/main" id="{31DF4356-6313-5EE7-025B-2B093CFDF9AE}"/>
+            </a:ext>
+          </a:extLst>
+        </p:cNvPr>
+        <p:cNvGrpSpPr/>
+        <p:nvPr/>
+      </p:nvGrpSpPr>
+      <p:grpSpPr>
+        <a:xfrm>
+          <a:off x="0" y="0"/>
+          <a:ext cx="0" cy="0"/>
+          <a:chOff x="0" y="0"/>
+          <a:chExt cx="0" cy="0"/>
+        </a:xfrm>
+      </p:grpSpPr>
+      <p:sp>
+        <p:nvSpPr>
+          <p:cNvPr id="2" name="Title 1">
+            <a:extLst>
+              <a:ext uri="{FF2B5EF4-FFF2-40B4-BE49-F238E27FC236}">
+                <a16:creationId xmlns:a16="http://schemas.microsoft.com/office/drawing/2014/main" id="{AEC43B11-5883-BEEF-A78B-4FE97BFEA94F}"/>
+              </a:ext>
+            </a:extLst>
+          </p:cNvPr>
+          <p:cNvSpPr>
+            <a:spLocks noGrp="1"/>
+          </p:cNvSpPr>
+          <p:nvPr>
+            <p:ph type="title"/>
+          </p:nvPr>
+        </p:nvSpPr>
+        <p:spPr/>
+        <p:txBody>
+          <a:bodyPr/>
+          <a:lstStyle/>
+          <a:p>
+            <a:r>
+              <a:rPr lang="en-US" b="1" u="sng" dirty="0"/>
+              <a:t>Sprints:</a:t>
+            </a:r>
+            <a:endParaRPr lang="en-GB" b="1" u="sng" dirty="0"/>
+          </a:p>
+        </p:txBody>
+      </p:sp>
+      <p:sp>
+        <p:nvSpPr>
+          <p:cNvPr id="3" name="Content Placeholder 2">
+            <a:extLst>
+              <a:ext uri="{FF2B5EF4-FFF2-40B4-BE49-F238E27FC236}">
+                <a16:creationId xmlns:a16="http://schemas.microsoft.com/office/drawing/2014/main" id="{0DB4F522-E93B-81FC-ABF2-43BA5717C41B}"/>
+              </a:ext>
+            </a:extLst>
+          </p:cNvPr>
+          <p:cNvSpPr>
+            <a:spLocks noGrp="1"/>
+          </p:cNvSpPr>
+          <p:nvPr>
+            <p:ph idx="1"/>
+          </p:nvPr>
+        </p:nvSpPr>
+        <p:spPr>
+          <a:xfrm>
+            <a:off x="875201" y="1255059"/>
+            <a:ext cx="8946541" cy="5468470"/>
+          </a:xfrm>
+        </p:spPr>
+        <p:txBody>
+          <a:bodyPr>
+            <a:normAutofit fontScale="77500" lnSpcReduction="20000"/>
+          </a:bodyPr>
+          <a:lstStyle/>
+          <a:p>
+            <a:pPr marL="0" indent="0">
+              <a:buNone/>
+            </a:pPr>
+            <a:r>
+              <a:rPr lang="en-US" dirty="0"/>
+              <a:t>Sprint 1:</a:t>
+            </a:r>
+          </a:p>
+          <a:p>
+            <a:r>
+              <a:rPr lang="en-US" dirty="0"/>
+              <a:t>Plan</a:t>
+            </a:r>
+          </a:p>
+          <a:p>
+            <a:r>
+              <a:rPr lang="en-US" dirty="0"/>
+              <a:t>Developing Basic Features</a:t>
+            </a:r>
+          </a:p>
+          <a:p>
+            <a:pPr marL="0" indent="0">
+              <a:buNone/>
+            </a:pPr>
+            <a:endParaRPr lang="en-US" dirty="0"/>
+          </a:p>
+          <a:p>
+            <a:pPr marL="0" indent="0">
+              <a:buNone/>
+            </a:pPr>
+            <a:r>
+              <a:rPr lang="en-US" dirty="0"/>
+              <a:t>Sprint 2:</a:t>
+            </a:r>
+          </a:p>
+          <a:p>
+            <a:r>
+              <a:rPr lang="en-US" dirty="0"/>
+              <a:t>Design and Implement the Freelancer Profile</a:t>
+            </a:r>
+          </a:p>
+          <a:p>
+            <a:pPr marL="0" indent="0">
+              <a:buNone/>
+            </a:pPr>
+            <a:endParaRPr lang="en-US" dirty="0"/>
+          </a:p>
+          <a:p>
+            <a:pPr marL="0" indent="0">
+              <a:buNone/>
+            </a:pPr>
+            <a:r>
+              <a:rPr lang="en-US" dirty="0"/>
+              <a:t>Sprint 3:</a:t>
+            </a:r>
+          </a:p>
+          <a:p>
+            <a:r>
+              <a:rPr lang="en-US" dirty="0"/>
+              <a:t>Integrate Payment Gateway</a:t>
+            </a:r>
+          </a:p>
+          <a:p>
+            <a:pPr marL="0" indent="0">
+              <a:buNone/>
+            </a:pPr>
+            <a:endParaRPr lang="en-US" dirty="0"/>
+          </a:p>
+          <a:p>
+            <a:pPr marL="0" indent="0">
+              <a:buNone/>
+            </a:pPr>
+            <a:r>
+              <a:rPr lang="en-US" dirty="0"/>
+              <a:t>Sprint 4:</a:t>
+            </a:r>
+          </a:p>
+          <a:p>
+            <a:r>
+              <a:rPr lang="en-US" dirty="0"/>
+              <a:t>Add job posting functionality</a:t>
+            </a:r>
+          </a:p>
+          <a:p>
+            <a:endParaRPr lang="en-US" dirty="0"/>
+          </a:p>
+          <a:p>
+            <a:pPr marL="0" indent="0">
+              <a:buNone/>
+            </a:pPr>
+            <a:r>
+              <a:rPr lang="en-US" dirty="0"/>
+              <a:t>Sprint 5:</a:t>
+            </a:r>
+          </a:p>
+          <a:p>
+            <a:r>
+              <a:rPr lang="en-US" dirty="0"/>
+              <a:t>Final Testing</a:t>
+            </a:r>
+          </a:p>
+          <a:p>
+            <a:r>
+              <a:rPr lang="en-US" dirty="0"/>
+              <a:t>Fix Bugs</a:t>
+            </a:r>
+          </a:p>
+          <a:p>
+            <a:r>
+              <a:rPr lang="en-US" dirty="0"/>
+              <a:t>Deployment</a:t>
+            </a:r>
+          </a:p>
+          <a:p>
+            <a:pPr marL="0" indent="0">
+              <a:buNone/>
+            </a:pPr>
+            <a:endParaRPr lang="en-US" dirty="0"/>
+          </a:p>
+          <a:p>
+            <a:pPr marL="0" indent="0">
+              <a:buNone/>
+            </a:pPr>
+            <a:endParaRPr lang="en-US" dirty="0"/>
+          </a:p>
+          <a:p>
+            <a:pPr marL="0" indent="0">
+              <a:buNone/>
+            </a:pPr>
+            <a:endParaRPr lang="en-US" dirty="0"/>
+          </a:p>
+          <a:p>
+            <a:pPr marL="0" indent="0">
+              <a:buNone/>
+            </a:pPr>
+            <a:endParaRPr lang="en-US" dirty="0"/>
+          </a:p>
+          <a:p>
+            <a:pPr marL="0" indent="0">
+              <a:buNone/>
+            </a:pPr>
+            <a:endParaRPr lang="en-US" dirty="0"/>
+          </a:p>
+        </p:txBody>
+      </p:sp>
+    </p:spTree>
+    <p:extLst>
+      <p:ext uri="{BB962C8B-B14F-4D97-AF65-F5344CB8AC3E}">
+        <p14:creationId xmlns:p14="http://schemas.microsoft.com/office/powerpoint/2010/main" val="4032393829"/>
+      </p:ext>
+    </p:extLst>
+  </p:cSld>
+  <p:clrMapOvr>
+    <a:masterClrMapping/>
+  </p:clrMapOvr>
+</p:sld>
+</file>
+
 <file path=ppt/slides/slide6.xml><?xml version="1.0" encoding="utf-8"?>
 <p:sld xmlns:a="http://schemas.openxmlformats.org/drawingml/2006/main" xmlns:r="http://schemas.openxmlformats.org/officeDocument/2006/relationships" xmlns:p="http://schemas.openxmlformats.org/presentationml/2006/main">
   <p:cSld>
@@ -8570,15 +7830,15 @@
       </p:sp>
       <p:pic>
         <p:nvPicPr>
-          <p:cNvPr id="1026" name="Picture 2" descr="dfd-lvl-0.png">
+          <p:cNvPr id="4" name="Picture 3">
             <a:extLst>
               <a:ext uri="{FF2B5EF4-FFF2-40B4-BE49-F238E27FC236}">
-                <a16:creationId xmlns:a16="http://schemas.microsoft.com/office/drawing/2014/main" id="{67645B36-E3B2-4156-AEB9-11055D5F77F9}"/>
+                <a16:creationId xmlns:a16="http://schemas.microsoft.com/office/drawing/2014/main" id="{5667DC4A-3EB4-7777-9B91-A359A626759A}"/>
               </a:ext>
             </a:extLst>
           </p:cNvPr>
           <p:cNvPicPr>
-            <a:picLocks noChangeAspect="1" noChangeArrowheads="1"/>
+            <a:picLocks noChangeAspect="1"/>
           </p:cNvPicPr>
           <p:nvPr/>
         </p:nvPicPr>
@@ -8590,29 +7850,18 @@
               </a:ext>
             </a:extLst>
           </a:blip>
-          <a:srcRect/>
           <a:stretch>
             <a:fillRect/>
           </a:stretch>
         </p:blipFill>
-        <p:spPr bwMode="auto">
+        <p:spPr>
           <a:xfrm>
-            <a:off x="1115026" y="2081398"/>
-            <a:ext cx="9553575" cy="2428875"/>
+            <a:off x="224118" y="1880349"/>
+            <a:ext cx="11797553" cy="3097302"/>
           </a:xfrm>
           <a:prstGeom prst="rect">
             <a:avLst/>
           </a:prstGeom>
-          <a:noFill/>
-          <a:extLst>
-            <a:ext uri="{909E8E84-426E-40DD-AFC4-6F175D3DCCD1}">
-              <a14:hiddenFill xmlns:a14="http://schemas.microsoft.com/office/drawing/2010/main">
-                <a:solidFill>
-                  <a:srgbClr val="FFFFFF"/>
-                </a:solidFill>
-              </a14:hiddenFill>
-            </a:ext>
-          </a:extLst>
         </p:spPr>
       </p:pic>
     </p:spTree>
@@ -8792,15 +8041,15 @@
       </p:sp>
       <p:pic>
         <p:nvPicPr>
-          <p:cNvPr id="4098" name="Picture 2" descr="er-diagram.png">
+          <p:cNvPr id="4" name="Picture 3">
             <a:extLst>
               <a:ext uri="{FF2B5EF4-FFF2-40B4-BE49-F238E27FC236}">
-                <a16:creationId xmlns:a16="http://schemas.microsoft.com/office/drawing/2014/main" id="{62C5854A-1253-4B8F-A76D-44B28C776218}"/>
+                <a16:creationId xmlns:a16="http://schemas.microsoft.com/office/drawing/2014/main" id="{D7E1C4C8-DCE9-2937-8B39-24D3840D2EC2}"/>
               </a:ext>
             </a:extLst>
           </p:cNvPr>
           <p:cNvPicPr>
-            <a:picLocks noChangeAspect="1" noChangeArrowheads="1"/>
+            <a:picLocks noChangeAspect="1"/>
           </p:cNvPicPr>
           <p:nvPr/>
         </p:nvPicPr>
@@ -8812,29 +8061,18 @@
               </a:ext>
             </a:extLst>
           </a:blip>
-          <a:srcRect/>
           <a:stretch>
             <a:fillRect/>
           </a:stretch>
         </p:blipFill>
-        <p:spPr bwMode="auto">
+        <p:spPr>
           <a:xfrm>
-            <a:off x="1065320" y="204186"/>
-            <a:ext cx="10677495" cy="6467383"/>
+            <a:off x="977153" y="89646"/>
+            <a:ext cx="10614211" cy="6768353"/>
           </a:xfrm>
           <a:prstGeom prst="rect">
             <a:avLst/>
           </a:prstGeom>
-          <a:noFill/>
-          <a:extLst>
-            <a:ext uri="{909E8E84-426E-40DD-AFC4-6F175D3DCCD1}">
-              <a14:hiddenFill xmlns:a14="http://schemas.microsoft.com/office/drawing/2010/main">
-                <a:solidFill>
-                  <a:srgbClr val="FFFFFF"/>
-                </a:solidFill>
-              </a14:hiddenFill>
-            </a:ext>
-          </a:extLst>
         </p:spPr>
       </p:pic>
     </p:spTree>
@@ -8858,7 +8096,7 @@
         <p:cNvPr id="1" name="">
           <a:extLst>
             <a:ext uri="{FF2B5EF4-FFF2-40B4-BE49-F238E27FC236}">
-              <a16:creationId xmlns:a16="http://schemas.microsoft.com/office/drawing/2014/main" id="{1BF3B339-8897-1221-3654-B3F003351004}"/>
+              <a16:creationId xmlns:a16="http://schemas.microsoft.com/office/drawing/2014/main" id="{BEA3E5F7-74BB-6106-3B49-D0F322B2FE0A}"/>
             </a:ext>
           </a:extLst>
         </p:cNvPr>
@@ -8878,7 +8116,7 @@
           <p:cNvPr id="2" name="Title 1">
             <a:extLst>
               <a:ext uri="{FF2B5EF4-FFF2-40B4-BE49-F238E27FC236}">
-                <a16:creationId xmlns:a16="http://schemas.microsoft.com/office/drawing/2014/main" id="{41D8994F-0BAD-E791-2D18-FA3ACAB2AA1F}"/>
+                <a16:creationId xmlns:a16="http://schemas.microsoft.com/office/drawing/2014/main" id="{0FD4C8C8-65B5-BA27-F8D6-672538516AC6}"/>
               </a:ext>
             </a:extLst>
           </p:cNvPr>
@@ -8901,7 +8139,7 @@
           <a:p>
             <a:r>
               <a:rPr lang="en-US" dirty="0"/>
-              <a:t>ER DIAGRAM</a:t>
+              <a:t>DFD Level -2</a:t>
             </a:r>
             <a:endParaRPr lang="en-GB" dirty="0"/>
           </a:p>
@@ -8909,10 +8147,10 @@
       </p:sp>
       <p:pic>
         <p:nvPicPr>
-          <p:cNvPr id="5" name="Picture 4">
+          <p:cNvPr id="4" name="Picture 3">
             <a:extLst>
               <a:ext uri="{FF2B5EF4-FFF2-40B4-BE49-F238E27FC236}">
-                <a16:creationId xmlns:a16="http://schemas.microsoft.com/office/drawing/2014/main" id="{ED25F5C3-6FFA-46E9-631F-E359A9E7DFD9}"/>
+                <a16:creationId xmlns:a16="http://schemas.microsoft.com/office/drawing/2014/main" id="{A4E4193F-2C71-0A94-3538-C98F98E90A5B}"/>
               </a:ext>
             </a:extLst>
           </p:cNvPr>
@@ -8922,15 +8160,21 @@
           <p:nvPr/>
         </p:nvPicPr>
         <p:blipFill>
-          <a:blip r:embed="rId2"/>
+          <a:blip r:embed="rId2">
+            <a:extLst>
+              <a:ext uri="{28A0092B-C50C-407E-A947-70E740481C1C}">
+                <a14:useLocalDpi xmlns:a14="http://schemas.microsoft.com/office/drawing/2010/main" val="0"/>
+              </a:ext>
+            </a:extLst>
+          </a:blip>
           <a:stretch>
             <a:fillRect/>
           </a:stretch>
         </p:blipFill>
         <p:spPr>
           <a:xfrm>
-            <a:off x="968188" y="116541"/>
-            <a:ext cx="11044518" cy="6598024"/>
+            <a:off x="1052857" y="331694"/>
+            <a:ext cx="10931954" cy="6311154"/>
           </a:xfrm>
           <a:prstGeom prst="rect">
             <a:avLst/>
@@ -8940,7 +8184,7 @@
     </p:spTree>
     <p:extLst>
       <p:ext uri="{BB962C8B-B14F-4D97-AF65-F5344CB8AC3E}">
-        <p14:creationId xmlns:p14="http://schemas.microsoft.com/office/powerpoint/2010/main" val="2323148503"/>
+        <p14:creationId xmlns:p14="http://schemas.microsoft.com/office/powerpoint/2010/main" val="226524632"/>
       </p:ext>
     </p:extLst>
   </p:cSld>

</xml_diff>

<commit_message>
edit: pptx and docs
</commit_message>
<xml_diff>
--- a/Documentation/Freelancing-Platform.pptx
+++ b/Documentation/Freelancing-Platform.pptx
@@ -1,24 +1,26 @@
 
 <file path=ppt/presentation.xml><?xml version="1.0" encoding="utf-8"?>
-<p:presentation xmlns:a="http://schemas.openxmlformats.org/drawingml/2006/main" xmlns:r="http://schemas.openxmlformats.org/officeDocument/2006/relationships" xmlns:p="http://schemas.openxmlformats.org/presentationml/2006/main" saveSubsetFonts="1">
+<p:presentation xmlns:a="http://schemas.openxmlformats.org/drawingml/2006/main" xmlns:r="http://schemas.openxmlformats.org/officeDocument/2006/relationships" xmlns:p="http://schemas.openxmlformats.org/presentationml/2006/main" showSpecialPlsOnTitleSld="0" saveSubsetFonts="1">
   <p:sldMasterIdLst>
     <p:sldMasterId id="2147483719" r:id="rId1"/>
   </p:sldMasterIdLst>
+  <p:notesMasterIdLst>
+    <p:notesMasterId r:id="rId15"/>
+  </p:notesMasterIdLst>
   <p:sldIdLst>
     <p:sldId id="256" r:id="rId2"/>
     <p:sldId id="258" r:id="rId3"/>
     <p:sldId id="260" r:id="rId4"/>
-    <p:sldId id="261" r:id="rId5"/>
-    <p:sldId id="279" r:id="rId6"/>
-    <p:sldId id="265" r:id="rId7"/>
-    <p:sldId id="264" r:id="rId8"/>
-    <p:sldId id="266" r:id="rId9"/>
-    <p:sldId id="276" r:id="rId10"/>
-    <p:sldId id="277" r:id="rId11"/>
-    <p:sldId id="272" r:id="rId12"/>
-    <p:sldId id="273" r:id="rId13"/>
-    <p:sldId id="274" r:id="rId14"/>
-    <p:sldId id="278" r:id="rId15"/>
+    <p:sldId id="280" r:id="rId5"/>
+    <p:sldId id="281" r:id="rId6"/>
+    <p:sldId id="261" r:id="rId7"/>
+    <p:sldId id="279" r:id="rId8"/>
+    <p:sldId id="265" r:id="rId9"/>
+    <p:sldId id="264" r:id="rId10"/>
+    <p:sldId id="266" r:id="rId11"/>
+    <p:sldId id="276" r:id="rId12"/>
+    <p:sldId id="277" r:id="rId13"/>
+    <p:sldId id="278" r:id="rId14"/>
   </p:sldIdLst>
   <p:sldSz cx="12192000" cy="6858000"/>
   <p:notesSz cx="6858000" cy="9144000"/>
@@ -125,6 +127,355 @@
 </p:presentation>
 </file>
 
+<file path=ppt/notesMasters/notesMaster1.xml><?xml version="1.0" encoding="utf-8"?>
+<p:notesMaster xmlns:a="http://schemas.openxmlformats.org/drawingml/2006/main" xmlns:r="http://schemas.openxmlformats.org/officeDocument/2006/relationships" xmlns:p="http://schemas.openxmlformats.org/presentationml/2006/main">
+  <p:cSld>
+    <p:bg>
+      <p:bgRef idx="1001">
+        <a:schemeClr val="bg1"/>
+      </p:bgRef>
+    </p:bg>
+    <p:spTree>
+      <p:nvGrpSpPr>
+        <p:cNvPr id="1" name=""/>
+        <p:cNvGrpSpPr/>
+        <p:nvPr/>
+      </p:nvGrpSpPr>
+      <p:grpSpPr>
+        <a:xfrm>
+          <a:off x="0" y="0"/>
+          <a:ext cx="0" cy="0"/>
+          <a:chOff x="0" y="0"/>
+          <a:chExt cx="0" cy="0"/>
+        </a:xfrm>
+      </p:grpSpPr>
+      <p:sp>
+        <p:nvSpPr>
+          <p:cNvPr id="2" name="Header Placeholder 1"/>
+          <p:cNvSpPr>
+            <a:spLocks noGrp="1"/>
+          </p:cNvSpPr>
+          <p:nvPr>
+            <p:ph type="hdr" sz="quarter"/>
+          </p:nvPr>
+        </p:nvSpPr>
+        <p:spPr>
+          <a:xfrm>
+            <a:off x="0" y="0"/>
+            <a:ext cx="2971800" cy="458788"/>
+          </a:xfrm>
+          <a:prstGeom prst="rect">
+            <a:avLst/>
+          </a:prstGeom>
+        </p:spPr>
+        <p:txBody>
+          <a:bodyPr vert="horz" lIns="91440" tIns="45720" rIns="91440" bIns="45720" rtlCol="0"/>
+          <a:lstStyle>
+            <a:lvl1pPr algn="l">
+              <a:defRPr sz="1200"/>
+            </a:lvl1pPr>
+          </a:lstStyle>
+          <a:p>
+            <a:endParaRPr lang="en-US"/>
+          </a:p>
+        </p:txBody>
+      </p:sp>
+      <p:sp>
+        <p:nvSpPr>
+          <p:cNvPr id="3" name="Date Placeholder 2"/>
+          <p:cNvSpPr>
+            <a:spLocks noGrp="1"/>
+          </p:cNvSpPr>
+          <p:nvPr>
+            <p:ph type="dt" idx="1"/>
+          </p:nvPr>
+        </p:nvSpPr>
+        <p:spPr>
+          <a:xfrm>
+            <a:off x="3884613" y="0"/>
+            <a:ext cx="2971800" cy="458788"/>
+          </a:xfrm>
+          <a:prstGeom prst="rect">
+            <a:avLst/>
+          </a:prstGeom>
+        </p:spPr>
+        <p:txBody>
+          <a:bodyPr vert="horz" lIns="91440" tIns="45720" rIns="91440" bIns="45720" rtlCol="0"/>
+          <a:lstStyle>
+            <a:lvl1pPr algn="r">
+              <a:defRPr sz="1200"/>
+            </a:lvl1pPr>
+          </a:lstStyle>
+          <a:p>
+            <a:fld id="{30911D7B-3C47-4B2D-8A54-A3FE5FA5E4D0}" type="datetimeFigureOut">
+              <a:rPr lang="en-US" smtClean="0"/>
+              <a:t>2/23/2025</a:t>
+            </a:fld>
+            <a:endParaRPr lang="en-US"/>
+          </a:p>
+        </p:txBody>
+      </p:sp>
+      <p:sp>
+        <p:nvSpPr>
+          <p:cNvPr id="4" name="Slide Image Placeholder 3"/>
+          <p:cNvSpPr>
+            <a:spLocks noGrp="1" noRot="1" noChangeAspect="1"/>
+          </p:cNvSpPr>
+          <p:nvPr>
+            <p:ph type="sldImg" idx="2"/>
+          </p:nvPr>
+        </p:nvSpPr>
+        <p:spPr>
+          <a:xfrm>
+            <a:off x="685800" y="1143000"/>
+            <a:ext cx="5486400" cy="3086100"/>
+          </a:xfrm>
+          <a:prstGeom prst="rect">
+            <a:avLst/>
+          </a:prstGeom>
+          <a:noFill/>
+          <a:ln w="12700">
+            <a:solidFill>
+              <a:prstClr val="black"/>
+            </a:solidFill>
+          </a:ln>
+        </p:spPr>
+        <p:txBody>
+          <a:bodyPr vert="horz" lIns="91440" tIns="45720" rIns="91440" bIns="45720" rtlCol="0" anchor="ctr"/>
+          <a:lstStyle/>
+          <a:p>
+            <a:endParaRPr lang="en-US"/>
+          </a:p>
+        </p:txBody>
+      </p:sp>
+      <p:sp>
+        <p:nvSpPr>
+          <p:cNvPr id="5" name="Notes Placeholder 4"/>
+          <p:cNvSpPr>
+            <a:spLocks noGrp="1"/>
+          </p:cNvSpPr>
+          <p:nvPr>
+            <p:ph type="body" sz="quarter" idx="3"/>
+          </p:nvPr>
+        </p:nvSpPr>
+        <p:spPr>
+          <a:xfrm>
+            <a:off x="685800" y="4400550"/>
+            <a:ext cx="5486400" cy="3600450"/>
+          </a:xfrm>
+          <a:prstGeom prst="rect">
+            <a:avLst/>
+          </a:prstGeom>
+        </p:spPr>
+        <p:txBody>
+          <a:bodyPr vert="horz" lIns="91440" tIns="45720" rIns="91440" bIns="45720" rtlCol="0"/>
+          <a:lstStyle/>
+          <a:p>
+            <a:pPr lvl="0"/>
+            <a:r>
+              <a:rPr lang="en-US"/>
+              <a:t>Click to edit Master text styles</a:t>
+            </a:r>
+          </a:p>
+          <a:p>
+            <a:pPr lvl="1"/>
+            <a:r>
+              <a:rPr lang="en-US"/>
+              <a:t>Second level</a:t>
+            </a:r>
+          </a:p>
+          <a:p>
+            <a:pPr lvl="2"/>
+            <a:r>
+              <a:rPr lang="en-US"/>
+              <a:t>Third level</a:t>
+            </a:r>
+          </a:p>
+          <a:p>
+            <a:pPr lvl="3"/>
+            <a:r>
+              <a:rPr lang="en-US"/>
+              <a:t>Fourth level</a:t>
+            </a:r>
+          </a:p>
+          <a:p>
+            <a:pPr lvl="4"/>
+            <a:r>
+              <a:rPr lang="en-US"/>
+              <a:t>Fifth level</a:t>
+            </a:r>
+          </a:p>
+        </p:txBody>
+      </p:sp>
+      <p:sp>
+        <p:nvSpPr>
+          <p:cNvPr id="6" name="Footer Placeholder 5"/>
+          <p:cNvSpPr>
+            <a:spLocks noGrp="1"/>
+          </p:cNvSpPr>
+          <p:nvPr>
+            <p:ph type="ftr" sz="quarter" idx="4"/>
+          </p:nvPr>
+        </p:nvSpPr>
+        <p:spPr>
+          <a:xfrm>
+            <a:off x="0" y="8685213"/>
+            <a:ext cx="2971800" cy="458787"/>
+          </a:xfrm>
+          <a:prstGeom prst="rect">
+            <a:avLst/>
+          </a:prstGeom>
+        </p:spPr>
+        <p:txBody>
+          <a:bodyPr vert="horz" lIns="91440" tIns="45720" rIns="91440" bIns="45720" rtlCol="0" anchor="b"/>
+          <a:lstStyle>
+            <a:lvl1pPr algn="l">
+              <a:defRPr sz="1200"/>
+            </a:lvl1pPr>
+          </a:lstStyle>
+          <a:p>
+            <a:endParaRPr lang="en-US"/>
+          </a:p>
+        </p:txBody>
+      </p:sp>
+      <p:sp>
+        <p:nvSpPr>
+          <p:cNvPr id="7" name="Slide Number Placeholder 6"/>
+          <p:cNvSpPr>
+            <a:spLocks noGrp="1"/>
+          </p:cNvSpPr>
+          <p:nvPr>
+            <p:ph type="sldNum" sz="quarter" idx="5"/>
+          </p:nvPr>
+        </p:nvSpPr>
+        <p:spPr>
+          <a:xfrm>
+            <a:off x="3884613" y="8685213"/>
+            <a:ext cx="2971800" cy="458787"/>
+          </a:xfrm>
+          <a:prstGeom prst="rect">
+            <a:avLst/>
+          </a:prstGeom>
+        </p:spPr>
+        <p:txBody>
+          <a:bodyPr vert="horz" lIns="91440" tIns="45720" rIns="91440" bIns="45720" rtlCol="0" anchor="b"/>
+          <a:lstStyle>
+            <a:lvl1pPr algn="r">
+              <a:defRPr sz="1200"/>
+            </a:lvl1pPr>
+          </a:lstStyle>
+          <a:p>
+            <a:fld id="{23D37B6C-FC11-4CC1-95E4-B4A133D1E781}" type="slidenum">
+              <a:rPr lang="en-US" smtClean="0"/>
+              <a:t>‹#›</a:t>
+            </a:fld>
+            <a:endParaRPr lang="en-US"/>
+          </a:p>
+        </p:txBody>
+      </p:sp>
+    </p:spTree>
+    <p:extLst>
+      <p:ext uri="{BB962C8B-B14F-4D97-AF65-F5344CB8AC3E}">
+        <p14:creationId xmlns:p14="http://schemas.microsoft.com/office/powerpoint/2010/main" val="1684629793"/>
+      </p:ext>
+    </p:extLst>
+  </p:cSld>
+  <p:clrMap bg1="lt1" tx1="dk1" bg2="lt2" tx2="dk2" accent1="accent1" accent2="accent2" accent3="accent3" accent4="accent4" accent5="accent5" accent6="accent6" hlink="hlink" folHlink="folHlink"/>
+  <p:notesStyle>
+    <a:lvl1pPr marL="0" algn="l" defTabSz="914400" rtl="0" eaLnBrk="1" latinLnBrk="0" hangingPunct="1">
+      <a:defRPr sz="1200" kern="1200">
+        <a:solidFill>
+          <a:schemeClr val="tx1"/>
+        </a:solidFill>
+        <a:latin typeface="+mn-lt"/>
+        <a:ea typeface="+mn-ea"/>
+        <a:cs typeface="+mn-cs"/>
+      </a:defRPr>
+    </a:lvl1pPr>
+    <a:lvl2pPr marL="457200" algn="l" defTabSz="914400" rtl="0" eaLnBrk="1" latinLnBrk="0" hangingPunct="1">
+      <a:defRPr sz="1200" kern="1200">
+        <a:solidFill>
+          <a:schemeClr val="tx1"/>
+        </a:solidFill>
+        <a:latin typeface="+mn-lt"/>
+        <a:ea typeface="+mn-ea"/>
+        <a:cs typeface="+mn-cs"/>
+      </a:defRPr>
+    </a:lvl2pPr>
+    <a:lvl3pPr marL="914400" algn="l" defTabSz="914400" rtl="0" eaLnBrk="1" latinLnBrk="0" hangingPunct="1">
+      <a:defRPr sz="1200" kern="1200">
+        <a:solidFill>
+          <a:schemeClr val="tx1"/>
+        </a:solidFill>
+        <a:latin typeface="+mn-lt"/>
+        <a:ea typeface="+mn-ea"/>
+        <a:cs typeface="+mn-cs"/>
+      </a:defRPr>
+    </a:lvl3pPr>
+    <a:lvl4pPr marL="1371600" algn="l" defTabSz="914400" rtl="0" eaLnBrk="1" latinLnBrk="0" hangingPunct="1">
+      <a:defRPr sz="1200" kern="1200">
+        <a:solidFill>
+          <a:schemeClr val="tx1"/>
+        </a:solidFill>
+        <a:latin typeface="+mn-lt"/>
+        <a:ea typeface="+mn-ea"/>
+        <a:cs typeface="+mn-cs"/>
+      </a:defRPr>
+    </a:lvl4pPr>
+    <a:lvl5pPr marL="1828800" algn="l" defTabSz="914400" rtl="0" eaLnBrk="1" latinLnBrk="0" hangingPunct="1">
+      <a:defRPr sz="1200" kern="1200">
+        <a:solidFill>
+          <a:schemeClr val="tx1"/>
+        </a:solidFill>
+        <a:latin typeface="+mn-lt"/>
+        <a:ea typeface="+mn-ea"/>
+        <a:cs typeface="+mn-cs"/>
+      </a:defRPr>
+    </a:lvl5pPr>
+    <a:lvl6pPr marL="2286000" algn="l" defTabSz="914400" rtl="0" eaLnBrk="1" latinLnBrk="0" hangingPunct="1">
+      <a:defRPr sz="1200" kern="1200">
+        <a:solidFill>
+          <a:schemeClr val="tx1"/>
+        </a:solidFill>
+        <a:latin typeface="+mn-lt"/>
+        <a:ea typeface="+mn-ea"/>
+        <a:cs typeface="+mn-cs"/>
+      </a:defRPr>
+    </a:lvl6pPr>
+    <a:lvl7pPr marL="2743200" algn="l" defTabSz="914400" rtl="0" eaLnBrk="1" latinLnBrk="0" hangingPunct="1">
+      <a:defRPr sz="1200" kern="1200">
+        <a:solidFill>
+          <a:schemeClr val="tx1"/>
+        </a:solidFill>
+        <a:latin typeface="+mn-lt"/>
+        <a:ea typeface="+mn-ea"/>
+        <a:cs typeface="+mn-cs"/>
+      </a:defRPr>
+    </a:lvl7pPr>
+    <a:lvl8pPr marL="3200400" algn="l" defTabSz="914400" rtl="0" eaLnBrk="1" latinLnBrk="0" hangingPunct="1">
+      <a:defRPr sz="1200" kern="1200">
+        <a:solidFill>
+          <a:schemeClr val="tx1"/>
+        </a:solidFill>
+        <a:latin typeface="+mn-lt"/>
+        <a:ea typeface="+mn-ea"/>
+        <a:cs typeface="+mn-cs"/>
+      </a:defRPr>
+    </a:lvl8pPr>
+    <a:lvl9pPr marL="3657600" algn="l" defTabSz="914400" rtl="0" eaLnBrk="1" latinLnBrk="0" hangingPunct="1">
+      <a:defRPr sz="1200" kern="1200">
+        <a:solidFill>
+          <a:schemeClr val="tx1"/>
+        </a:solidFill>
+        <a:latin typeface="+mn-lt"/>
+        <a:ea typeface="+mn-ea"/>
+        <a:cs typeface="+mn-cs"/>
+      </a:defRPr>
+    </a:lvl9pPr>
+  </p:notesStyle>
+</p:notesMaster>
+</file>
+
 <file path=ppt/slideLayouts/slideLayout1.xml><?xml version="1.0" encoding="utf-8"?>
 <p:sldLayout xmlns:a="http://schemas.openxmlformats.org/drawingml/2006/main" xmlns:r="http://schemas.openxmlformats.org/officeDocument/2006/relationships" xmlns:p="http://schemas.openxmlformats.org/presentationml/2006/main" type="title" preserve="1">
   <p:cSld name="Title Slide">
@@ -309,7 +660,7 @@
           <a:bodyPr/>
           <a:lstStyle/>
           <a:p>
-            <a:fld id="{76C02864-96C3-44B4-ACD4-22E2B7896A37}" type="datetimeFigureOut">
+            <a:fld id="{D8E35396-A9D0-4AE7-A007-0119BDFBA4E5}" type="datetime1">
               <a:rPr lang="en-GB" smtClean="0"/>
               <a:t>23/02/2025</a:t>
             </a:fld>
@@ -584,7 +935,7 @@
           <a:bodyPr/>
           <a:lstStyle/>
           <a:p>
-            <a:fld id="{76C02864-96C3-44B4-ACD4-22E2B7896A37}" type="datetimeFigureOut">
+            <a:fld id="{56C807C0-A158-4B11-8417-3F07CC34F354}" type="datetime1">
               <a:rPr lang="en-GB" smtClean="0"/>
               <a:t>23/02/2025</a:t>
             </a:fld>
@@ -778,7 +1129,7 @@
           <a:bodyPr/>
           <a:lstStyle/>
           <a:p>
-            <a:fld id="{76C02864-96C3-44B4-ACD4-22E2B7896A37}" type="datetimeFigureOut">
+            <a:fld id="{A2CF71DC-7CE6-4D2B-BA0B-60B263F95B35}" type="datetime1">
               <a:rPr lang="en-GB" smtClean="0"/>
               <a:t>23/02/2025</a:t>
             </a:fld>
@@ -1051,7 +1402,7 @@
           <a:bodyPr/>
           <a:lstStyle/>
           <a:p>
-            <a:fld id="{76C02864-96C3-44B4-ACD4-22E2B7896A37}" type="datetimeFigureOut">
+            <a:fld id="{A30FD4C2-647D-42E0-BBD9-677229B0AD15}" type="datetime1">
               <a:rPr lang="en-GB" smtClean="0"/>
               <a:t>23/02/2025</a:t>
             </a:fld>
@@ -1392,7 +1743,7 @@
           <a:bodyPr/>
           <a:lstStyle/>
           <a:p>
-            <a:fld id="{76C02864-96C3-44B4-ACD4-22E2B7896A37}" type="datetimeFigureOut">
+            <a:fld id="{5FD9DC11-EA09-4B4D-9CD8-F746B92C3C1C}" type="datetime1">
               <a:rPr lang="en-GB" smtClean="0"/>
               <a:t>23/02/2025</a:t>
             </a:fld>
@@ -2015,7 +2366,7 @@
           <a:bodyPr/>
           <a:lstStyle/>
           <a:p>
-            <a:fld id="{76C02864-96C3-44B4-ACD4-22E2B7896A37}" type="datetimeFigureOut">
+            <a:fld id="{00A5AD0B-D988-4D47-AE95-D3257A5B348F}" type="datetime1">
               <a:rPr lang="en-GB" smtClean="0"/>
               <a:t>23/02/2025</a:t>
             </a:fld>
@@ -2875,7 +3226,7 @@
           <a:bodyPr/>
           <a:lstStyle/>
           <a:p>
-            <a:fld id="{76C02864-96C3-44B4-ACD4-22E2B7896A37}" type="datetimeFigureOut">
+            <a:fld id="{2E0420D5-471D-43EE-8DA2-BA202F769145}" type="datetime1">
               <a:rPr lang="en-GB" smtClean="0"/>
               <a:t>23/02/2025</a:t>
             </a:fld>
@@ -3045,7 +3396,7 @@
           <a:bodyPr/>
           <a:lstStyle/>
           <a:p>
-            <a:fld id="{76C02864-96C3-44B4-ACD4-22E2B7896A37}" type="datetimeFigureOut">
+            <a:fld id="{54F79E30-77D1-449F-897D-BE4DDADBFDB3}" type="datetime1">
               <a:rPr lang="en-GB" smtClean="0"/>
               <a:t>23/02/2025</a:t>
             </a:fld>
@@ -3225,7 +3576,7 @@
           <a:bodyPr/>
           <a:lstStyle/>
           <a:p>
-            <a:fld id="{76C02864-96C3-44B4-ACD4-22E2B7896A37}" type="datetimeFigureOut">
+            <a:fld id="{3547D05D-7D0F-454B-BFA5-F0DC84EA3CE7}" type="datetime1">
               <a:rPr lang="en-GB" smtClean="0"/>
               <a:t>23/02/2025</a:t>
             </a:fld>
@@ -3395,7 +3746,7 @@
           <a:bodyPr/>
           <a:lstStyle/>
           <a:p>
-            <a:fld id="{76C02864-96C3-44B4-ACD4-22E2B7896A37}" type="datetimeFigureOut">
+            <a:fld id="{9A85DA22-321A-43DD-B8C5-3BF00E7BEA09}" type="datetime1">
               <a:rPr lang="en-GB" smtClean="0"/>
               <a:t>23/02/2025</a:t>
             </a:fld>
@@ -3642,7 +3993,7 @@
           <a:bodyPr/>
           <a:lstStyle/>
           <a:p>
-            <a:fld id="{76C02864-96C3-44B4-ACD4-22E2B7896A37}" type="datetimeFigureOut">
+            <a:fld id="{239554BB-B14A-4BAB-8DD1-406BD3E5F91D}" type="datetime1">
               <a:rPr lang="en-GB" smtClean="0"/>
               <a:t>23/02/2025</a:t>
             </a:fld>
@@ -3934,7 +4285,7 @@
           <a:bodyPr/>
           <a:lstStyle/>
           <a:p>
-            <a:fld id="{76C02864-96C3-44B4-ACD4-22E2B7896A37}" type="datetimeFigureOut">
+            <a:fld id="{220EC84E-BCB4-4462-8314-78204731E3AE}" type="datetime1">
               <a:rPr lang="en-GB" smtClean="0"/>
               <a:t>23/02/2025</a:t>
             </a:fld>
@@ -4378,7 +4729,7 @@
           <a:bodyPr/>
           <a:lstStyle/>
           <a:p>
-            <a:fld id="{76C02864-96C3-44B4-ACD4-22E2B7896A37}" type="datetimeFigureOut">
+            <a:fld id="{3CBBF0C5-0C45-454D-9C90-4E71AA877EA7}" type="datetime1">
               <a:rPr lang="en-GB" smtClean="0"/>
               <a:t>23/02/2025</a:t>
             </a:fld>
@@ -4496,7 +4847,7 @@
           <a:bodyPr/>
           <a:lstStyle/>
           <a:p>
-            <a:fld id="{76C02864-96C3-44B4-ACD4-22E2B7896A37}" type="datetimeFigureOut">
+            <a:fld id="{6D39ECB5-B446-4FF4-8902-23539669B94C}" type="datetime1">
               <a:rPr lang="en-GB" smtClean="0"/>
               <a:t>23/02/2025</a:t>
             </a:fld>
@@ -4591,7 +4942,7 @@
           <a:bodyPr/>
           <a:lstStyle/>
           <a:p>
-            <a:fld id="{76C02864-96C3-44B4-ACD4-22E2B7896A37}" type="datetimeFigureOut">
+            <a:fld id="{EC05BDF5-5A88-461F-99D4-CB97B904DEB2}" type="datetime1">
               <a:rPr lang="en-GB" smtClean="0"/>
               <a:t>23/02/2025</a:t>
             </a:fld>
@@ -4870,7 +5221,7 @@
           <a:bodyPr/>
           <a:lstStyle/>
           <a:p>
-            <a:fld id="{76C02864-96C3-44B4-ACD4-22E2B7896A37}" type="datetimeFigureOut">
+            <a:fld id="{39244691-36B2-4C2E-A248-9AC7A9B8E75D}" type="datetime1">
               <a:rPr lang="en-GB" smtClean="0"/>
               <a:t>23/02/2025</a:t>
             </a:fld>
@@ -5145,7 +5496,7 @@
           <a:bodyPr/>
           <a:lstStyle/>
           <a:p>
-            <a:fld id="{76C02864-96C3-44B4-ACD4-22E2B7896A37}" type="datetimeFigureOut">
+            <a:fld id="{63E4C76B-9905-4650-89EA-7BFB31A8D848}" type="datetime1">
               <a:rPr lang="en-GB" smtClean="0"/>
               <a:t>23/02/2025</a:t>
             </a:fld>
@@ -5574,7 +5925,7 @@
             </a:lvl1pPr>
           </a:lstStyle>
           <a:p>
-            <a:fld id="{76C02864-96C3-44B4-ACD4-22E2B7896A37}" type="datetimeFigureOut">
+            <a:fld id="{FDD55CEF-30A5-4DD4-BDCF-513BAE0B90CF}" type="datetime1">
               <a:rPr lang="en-GB" smtClean="0"/>
               <a:t>23/02/2025</a:t>
             </a:fld>
@@ -5688,6 +6039,7 @@
     <p:sldLayoutId id="2147483735" r:id="rId16"/>
     <p:sldLayoutId id="2147483736" r:id="rId17"/>
   </p:sldLayoutIdLst>
+  <p:hf hdr="0" ftr="0" dt="0"/>
   <p:txStyles>
     <p:titleStyle>
       <a:lvl1pPr algn="l" defTabSz="457200" rtl="0" eaLnBrk="1" latinLnBrk="0" hangingPunct="1">
@@ -6206,6 +6558,270 @@
   <p:cSld>
     <p:spTree>
       <p:nvGrpSpPr>
+        <p:cNvPr id="1" name=""/>
+        <p:cNvGrpSpPr/>
+        <p:nvPr/>
+      </p:nvGrpSpPr>
+      <p:grpSpPr>
+        <a:xfrm>
+          <a:off x="0" y="0"/>
+          <a:ext cx="0" cy="0"/>
+          <a:chOff x="0" y="0"/>
+          <a:chExt cx="0" cy="0"/>
+        </a:xfrm>
+      </p:grpSpPr>
+      <p:sp>
+        <p:nvSpPr>
+          <p:cNvPr id="2" name="Title 1">
+            <a:extLst>
+              <a:ext uri="{FF2B5EF4-FFF2-40B4-BE49-F238E27FC236}">
+                <a16:creationId xmlns:a16="http://schemas.microsoft.com/office/drawing/2014/main" id="{A6F56FBE-8279-4765-9FB3-D4A032F08FBC}"/>
+              </a:ext>
+            </a:extLst>
+          </p:cNvPr>
+          <p:cNvSpPr>
+            <a:spLocks noGrp="1"/>
+          </p:cNvSpPr>
+          <p:nvPr>
+            <p:ph type="title"/>
+          </p:nvPr>
+        </p:nvSpPr>
+        <p:spPr>
+          <a:xfrm rot="16200000">
+            <a:off x="-1521980" y="2369839"/>
+            <a:ext cx="4444490" cy="1400530"/>
+          </a:xfrm>
+        </p:spPr>
+        <p:txBody>
+          <a:bodyPr/>
+          <a:lstStyle/>
+          <a:p>
+            <a:r>
+              <a:rPr lang="en-US" dirty="0"/>
+              <a:t>ER DIAGRAM</a:t>
+            </a:r>
+            <a:endParaRPr lang="en-GB" dirty="0"/>
+          </a:p>
+        </p:txBody>
+      </p:sp>
+      <p:pic>
+        <p:nvPicPr>
+          <p:cNvPr id="4" name="Picture 3">
+            <a:extLst>
+              <a:ext uri="{FF2B5EF4-FFF2-40B4-BE49-F238E27FC236}">
+                <a16:creationId xmlns:a16="http://schemas.microsoft.com/office/drawing/2014/main" id="{D7E1C4C8-DCE9-2937-8B39-24D3840D2EC2}"/>
+              </a:ext>
+            </a:extLst>
+          </p:cNvPr>
+          <p:cNvPicPr>
+            <a:picLocks noChangeAspect="1"/>
+          </p:cNvPicPr>
+          <p:nvPr/>
+        </p:nvPicPr>
+        <p:blipFill>
+          <a:blip r:embed="rId2">
+            <a:extLst>
+              <a:ext uri="{28A0092B-C50C-407E-A947-70E740481C1C}">
+                <a14:useLocalDpi xmlns:a14="http://schemas.microsoft.com/office/drawing/2010/main" val="0"/>
+              </a:ext>
+            </a:extLst>
+          </a:blip>
+          <a:stretch>
+            <a:fillRect/>
+          </a:stretch>
+        </p:blipFill>
+        <p:spPr>
+          <a:xfrm>
+            <a:off x="576528" y="44823"/>
+            <a:ext cx="9957001" cy="6768353"/>
+          </a:xfrm>
+          <a:prstGeom prst="rect">
+            <a:avLst/>
+          </a:prstGeom>
+        </p:spPr>
+      </p:pic>
+      <p:sp>
+        <p:nvSpPr>
+          <p:cNvPr id="3" name="Slide Number Placeholder 2">
+            <a:extLst>
+              <a:ext uri="{FF2B5EF4-FFF2-40B4-BE49-F238E27FC236}">
+                <a16:creationId xmlns:a16="http://schemas.microsoft.com/office/drawing/2014/main" id="{4C17BAEB-9CEA-B9C1-19B7-925C4A1DC39C}"/>
+              </a:ext>
+            </a:extLst>
+          </p:cNvPr>
+          <p:cNvSpPr>
+            <a:spLocks noGrp="1"/>
+          </p:cNvSpPr>
+          <p:nvPr>
+            <p:ph type="sldNum" sz="quarter" idx="12"/>
+          </p:nvPr>
+        </p:nvSpPr>
+        <p:spPr/>
+        <p:txBody>
+          <a:bodyPr/>
+          <a:lstStyle/>
+          <a:p>
+            <a:fld id="{452661BF-F4F2-4852-B4BE-7723DA5457E7}" type="slidenum">
+              <a:rPr lang="en-GB" smtClean="0"/>
+              <a:t>10</a:t>
+            </a:fld>
+            <a:endParaRPr lang="en-GB"/>
+          </a:p>
+        </p:txBody>
+      </p:sp>
+    </p:spTree>
+    <p:extLst>
+      <p:ext uri="{BB962C8B-B14F-4D97-AF65-F5344CB8AC3E}">
+        <p14:creationId xmlns:p14="http://schemas.microsoft.com/office/powerpoint/2010/main" val="410575750"/>
+      </p:ext>
+    </p:extLst>
+  </p:cSld>
+  <p:clrMapOvr>
+    <a:masterClrMapping/>
+  </p:clrMapOvr>
+</p:sld>
+</file>
+
+<file path=ppt/slides/slide11.xml><?xml version="1.0" encoding="utf-8"?>
+<p:sld xmlns:a="http://schemas.openxmlformats.org/drawingml/2006/main" xmlns:r="http://schemas.openxmlformats.org/officeDocument/2006/relationships" xmlns:p="http://schemas.openxmlformats.org/presentationml/2006/main">
+  <p:cSld>
+    <p:spTree>
+      <p:nvGrpSpPr>
+        <p:cNvPr id="1" name="">
+          <a:extLst>
+            <a:ext uri="{FF2B5EF4-FFF2-40B4-BE49-F238E27FC236}">
+              <a16:creationId xmlns:a16="http://schemas.microsoft.com/office/drawing/2014/main" id="{BEA3E5F7-74BB-6106-3B49-D0F322B2FE0A}"/>
+            </a:ext>
+          </a:extLst>
+        </p:cNvPr>
+        <p:cNvGrpSpPr/>
+        <p:nvPr/>
+      </p:nvGrpSpPr>
+      <p:grpSpPr>
+        <a:xfrm>
+          <a:off x="0" y="0"/>
+          <a:ext cx="0" cy="0"/>
+          <a:chOff x="0" y="0"/>
+          <a:chExt cx="0" cy="0"/>
+        </a:xfrm>
+      </p:grpSpPr>
+      <p:sp>
+        <p:nvSpPr>
+          <p:cNvPr id="2" name="Title 1">
+            <a:extLst>
+              <a:ext uri="{FF2B5EF4-FFF2-40B4-BE49-F238E27FC236}">
+                <a16:creationId xmlns:a16="http://schemas.microsoft.com/office/drawing/2014/main" id="{0FD4C8C8-65B5-BA27-F8D6-672538516AC6}"/>
+              </a:ext>
+            </a:extLst>
+          </p:cNvPr>
+          <p:cNvSpPr>
+            <a:spLocks noGrp="1"/>
+          </p:cNvSpPr>
+          <p:nvPr>
+            <p:ph type="title"/>
+          </p:nvPr>
+        </p:nvSpPr>
+        <p:spPr>
+          <a:xfrm rot="16200000">
+            <a:off x="-1592222" y="2271227"/>
+            <a:ext cx="4444490" cy="1400530"/>
+          </a:xfrm>
+        </p:spPr>
+        <p:txBody>
+          <a:bodyPr/>
+          <a:lstStyle/>
+          <a:p>
+            <a:r>
+              <a:rPr lang="en-US" dirty="0"/>
+              <a:t>DFD Level -2</a:t>
+            </a:r>
+            <a:endParaRPr lang="en-GB" dirty="0"/>
+          </a:p>
+        </p:txBody>
+      </p:sp>
+      <p:pic>
+        <p:nvPicPr>
+          <p:cNvPr id="4" name="Picture 3">
+            <a:extLst>
+              <a:ext uri="{FF2B5EF4-FFF2-40B4-BE49-F238E27FC236}">
+                <a16:creationId xmlns:a16="http://schemas.microsoft.com/office/drawing/2014/main" id="{A4E4193F-2C71-0A94-3538-C98F98E90A5B}"/>
+              </a:ext>
+            </a:extLst>
+          </p:cNvPr>
+          <p:cNvPicPr>
+            <a:picLocks noChangeAspect="1"/>
+          </p:cNvPicPr>
+          <p:nvPr/>
+        </p:nvPicPr>
+        <p:blipFill>
+          <a:blip r:embed="rId2">
+            <a:extLst>
+              <a:ext uri="{28A0092B-C50C-407E-A947-70E740481C1C}">
+                <a14:useLocalDpi xmlns:a14="http://schemas.microsoft.com/office/drawing/2010/main" val="0"/>
+              </a:ext>
+            </a:extLst>
+          </a:blip>
+          <a:stretch>
+            <a:fillRect/>
+          </a:stretch>
+        </p:blipFill>
+        <p:spPr>
+          <a:xfrm>
+            <a:off x="630023" y="179294"/>
+            <a:ext cx="9795930" cy="6427589"/>
+          </a:xfrm>
+          <a:prstGeom prst="rect">
+            <a:avLst/>
+          </a:prstGeom>
+        </p:spPr>
+      </p:pic>
+      <p:sp>
+        <p:nvSpPr>
+          <p:cNvPr id="3" name="Slide Number Placeholder 2">
+            <a:extLst>
+              <a:ext uri="{FF2B5EF4-FFF2-40B4-BE49-F238E27FC236}">
+                <a16:creationId xmlns:a16="http://schemas.microsoft.com/office/drawing/2014/main" id="{CE087E8B-A672-44F0-322E-003C67EE43F2}"/>
+              </a:ext>
+            </a:extLst>
+          </p:cNvPr>
+          <p:cNvSpPr>
+            <a:spLocks noGrp="1"/>
+          </p:cNvSpPr>
+          <p:nvPr>
+            <p:ph type="sldNum" sz="quarter" idx="12"/>
+          </p:nvPr>
+        </p:nvSpPr>
+        <p:spPr/>
+        <p:txBody>
+          <a:bodyPr/>
+          <a:lstStyle/>
+          <a:p>
+            <a:fld id="{452661BF-F4F2-4852-B4BE-7723DA5457E7}" type="slidenum">
+              <a:rPr lang="en-GB" smtClean="0"/>
+              <a:t>11</a:t>
+            </a:fld>
+            <a:endParaRPr lang="en-GB"/>
+          </a:p>
+        </p:txBody>
+      </p:sp>
+    </p:spTree>
+    <p:extLst>
+      <p:ext uri="{BB962C8B-B14F-4D97-AF65-F5344CB8AC3E}">
+        <p14:creationId xmlns:p14="http://schemas.microsoft.com/office/powerpoint/2010/main" val="226524632"/>
+      </p:ext>
+    </p:extLst>
+  </p:cSld>
+  <p:clrMapOvr>
+    <a:masterClrMapping/>
+  </p:clrMapOvr>
+</p:sld>
+</file>
+
+<file path=ppt/slides/slide12.xml><?xml version="1.0" encoding="utf-8"?>
+<p:sld xmlns:a="http://schemas.openxmlformats.org/drawingml/2006/main" xmlns:r="http://schemas.openxmlformats.org/officeDocument/2006/relationships" xmlns:p="http://schemas.openxmlformats.org/presentationml/2006/main">
+  <p:cSld>
+    <p:spTree>
+      <p:nvGrpSpPr>
         <p:cNvPr id="1" name="">
           <a:extLst>
             <a:ext uri="{FF2B5EF4-FFF2-40B4-BE49-F238E27FC236}">
@@ -6294,395 +6910,39 @@
           </a:prstGeom>
         </p:spPr>
       </p:pic>
+      <p:sp>
+        <p:nvSpPr>
+          <p:cNvPr id="3" name="Slide Number Placeholder 2">
+            <a:extLst>
+              <a:ext uri="{FF2B5EF4-FFF2-40B4-BE49-F238E27FC236}">
+                <a16:creationId xmlns:a16="http://schemas.microsoft.com/office/drawing/2014/main" id="{93507F5D-5BD0-54A9-B6E6-6EBBC05596DF}"/>
+              </a:ext>
+            </a:extLst>
+          </p:cNvPr>
+          <p:cNvSpPr>
+            <a:spLocks noGrp="1"/>
+          </p:cNvSpPr>
+          <p:nvPr>
+            <p:ph type="sldNum" sz="quarter" idx="12"/>
+          </p:nvPr>
+        </p:nvSpPr>
+        <p:spPr/>
+        <p:txBody>
+          <a:bodyPr/>
+          <a:lstStyle/>
+          <a:p>
+            <a:fld id="{452661BF-F4F2-4852-B4BE-7723DA5457E7}" type="slidenum">
+              <a:rPr lang="en-GB" smtClean="0"/>
+              <a:t>12</a:t>
+            </a:fld>
+            <a:endParaRPr lang="en-GB"/>
+          </a:p>
+        </p:txBody>
+      </p:sp>
     </p:spTree>
     <p:extLst>
       <p:ext uri="{BB962C8B-B14F-4D97-AF65-F5344CB8AC3E}">
         <p14:creationId xmlns:p14="http://schemas.microsoft.com/office/powerpoint/2010/main" val="2323148503"/>
-      </p:ext>
-    </p:extLst>
-  </p:cSld>
-  <p:clrMapOvr>
-    <a:masterClrMapping/>
-  </p:clrMapOvr>
-</p:sld>
-</file>
-
-<file path=ppt/slides/slide11.xml><?xml version="1.0" encoding="utf-8"?>
-<p:sld xmlns:a="http://schemas.openxmlformats.org/drawingml/2006/main" xmlns:r="http://schemas.openxmlformats.org/officeDocument/2006/relationships" xmlns:p="http://schemas.openxmlformats.org/presentationml/2006/main">
-  <p:cSld>
-    <p:spTree>
-      <p:nvGrpSpPr>
-        <p:cNvPr id="1" name=""/>
-        <p:cNvGrpSpPr/>
-        <p:nvPr/>
-      </p:nvGrpSpPr>
-      <p:grpSpPr>
-        <a:xfrm>
-          <a:off x="0" y="0"/>
-          <a:ext cx="0" cy="0"/>
-          <a:chOff x="0" y="0"/>
-          <a:chExt cx="0" cy="0"/>
-        </a:xfrm>
-      </p:grpSpPr>
-      <p:sp>
-        <p:nvSpPr>
-          <p:cNvPr id="2" name="Title 1">
-            <a:extLst>
-              <a:ext uri="{FF2B5EF4-FFF2-40B4-BE49-F238E27FC236}">
-                <a16:creationId xmlns:a16="http://schemas.microsoft.com/office/drawing/2014/main" id="{C41843B4-0C95-4BA2-A80C-F3A2047662A0}"/>
-              </a:ext>
-            </a:extLst>
-          </p:cNvPr>
-          <p:cNvSpPr>
-            <a:spLocks noGrp="1"/>
-          </p:cNvSpPr>
-          <p:nvPr>
-            <p:ph type="title"/>
-          </p:nvPr>
-        </p:nvSpPr>
-        <p:spPr/>
-        <p:txBody>
-          <a:bodyPr/>
-          <a:lstStyle/>
-          <a:p>
-            <a:r>
-              <a:rPr lang="en-US" dirty="0"/>
-              <a:t>CSS issue faced</a:t>
-            </a:r>
-            <a:endParaRPr lang="en-GB" dirty="0"/>
-          </a:p>
-        </p:txBody>
-      </p:sp>
-      <p:sp>
-        <p:nvSpPr>
-          <p:cNvPr id="3" name="Text Placeholder 2">
-            <a:extLst>
-              <a:ext uri="{FF2B5EF4-FFF2-40B4-BE49-F238E27FC236}">
-                <a16:creationId xmlns:a16="http://schemas.microsoft.com/office/drawing/2014/main" id="{826C9415-A37B-41D6-A38F-3D0EDF2BC368}"/>
-              </a:ext>
-            </a:extLst>
-          </p:cNvPr>
-          <p:cNvSpPr>
-            <a:spLocks noGrp="1"/>
-          </p:cNvSpPr>
-          <p:nvPr>
-            <p:ph type="body" idx="1"/>
-          </p:nvPr>
-        </p:nvSpPr>
-        <p:spPr/>
-        <p:txBody>
-          <a:bodyPr/>
-          <a:lstStyle/>
-          <a:p>
-            <a:r>
-              <a:rPr lang="en-US" dirty="0"/>
-              <a:t>One CSS file for all pages</a:t>
-            </a:r>
-            <a:endParaRPr lang="en-GB" dirty="0"/>
-          </a:p>
-        </p:txBody>
-      </p:sp>
-      <p:pic>
-        <p:nvPicPr>
-          <p:cNvPr id="8" name="Content Placeholder 7">
-            <a:extLst>
-              <a:ext uri="{FF2B5EF4-FFF2-40B4-BE49-F238E27FC236}">
-                <a16:creationId xmlns:a16="http://schemas.microsoft.com/office/drawing/2014/main" id="{40156C23-3E9B-42D3-877B-243AAC32DFD3}"/>
-              </a:ext>
-            </a:extLst>
-          </p:cNvPr>
-          <p:cNvPicPr>
-            <a:picLocks noGrp="1" noChangeAspect="1"/>
-          </p:cNvPicPr>
-          <p:nvPr>
-            <p:ph sz="half" idx="2"/>
-          </p:nvPr>
-        </p:nvPicPr>
-        <p:blipFill>
-          <a:blip r:embed="rId2"/>
-          <a:stretch>
-            <a:fillRect/>
-          </a:stretch>
-        </p:blipFill>
-        <p:spPr>
-          <a:xfrm>
-            <a:off x="1103313" y="2908056"/>
-            <a:ext cx="4395787" cy="2954826"/>
-          </a:xfrm>
-          <a:prstGeom prst="rect">
-            <a:avLst/>
-          </a:prstGeom>
-        </p:spPr>
-      </p:pic>
-      <p:sp>
-        <p:nvSpPr>
-          <p:cNvPr id="5" name="Text Placeholder 4">
-            <a:extLst>
-              <a:ext uri="{FF2B5EF4-FFF2-40B4-BE49-F238E27FC236}">
-                <a16:creationId xmlns:a16="http://schemas.microsoft.com/office/drawing/2014/main" id="{89076F79-E4E0-4347-A2E9-DEF0EAD87FF6}"/>
-              </a:ext>
-            </a:extLst>
-          </p:cNvPr>
-          <p:cNvSpPr>
-            <a:spLocks noGrp="1"/>
-          </p:cNvSpPr>
-          <p:nvPr>
-            <p:ph type="body" sz="quarter" idx="3"/>
-          </p:nvPr>
-        </p:nvSpPr>
-        <p:spPr>
-          <a:xfrm>
-            <a:off x="6096000" y="1910179"/>
-            <a:ext cx="4396339" cy="576262"/>
-          </a:xfrm>
-        </p:spPr>
-        <p:txBody>
-          <a:bodyPr/>
-          <a:lstStyle/>
-          <a:p>
-            <a:r>
-              <a:rPr lang="en-US" dirty="0"/>
-              <a:t>CSS within same page</a:t>
-            </a:r>
-            <a:endParaRPr lang="en-GB" dirty="0"/>
-          </a:p>
-        </p:txBody>
-      </p:sp>
-      <p:pic>
-        <p:nvPicPr>
-          <p:cNvPr id="7" name="Content Placeholder 6">
-            <a:extLst>
-              <a:ext uri="{FF2B5EF4-FFF2-40B4-BE49-F238E27FC236}">
-                <a16:creationId xmlns:a16="http://schemas.microsoft.com/office/drawing/2014/main" id="{637CC5F4-4635-491B-9260-3224CC224EF7}"/>
-              </a:ext>
-            </a:extLst>
-          </p:cNvPr>
-          <p:cNvPicPr>
-            <a:picLocks noGrp="1" noChangeAspect="1"/>
-          </p:cNvPicPr>
-          <p:nvPr>
-            <p:ph sz="quarter" idx="4"/>
-          </p:nvPr>
-        </p:nvPicPr>
-        <p:blipFill>
-          <a:blip r:embed="rId3"/>
-          <a:stretch>
-            <a:fillRect/>
-          </a:stretch>
-        </p:blipFill>
-        <p:spPr>
-          <a:xfrm>
-            <a:off x="6132998" y="2519779"/>
-            <a:ext cx="4322152" cy="3741738"/>
-          </a:xfrm>
-          <a:prstGeom prst="rect">
-            <a:avLst/>
-          </a:prstGeom>
-        </p:spPr>
-      </p:pic>
-    </p:spTree>
-    <p:extLst>
-      <p:ext uri="{BB962C8B-B14F-4D97-AF65-F5344CB8AC3E}">
-        <p14:creationId xmlns:p14="http://schemas.microsoft.com/office/powerpoint/2010/main" val="1438277379"/>
-      </p:ext>
-    </p:extLst>
-  </p:cSld>
-  <p:clrMapOvr>
-    <a:masterClrMapping/>
-  </p:clrMapOvr>
-</p:sld>
-</file>
-
-<file path=ppt/slides/slide12.xml><?xml version="1.0" encoding="utf-8"?>
-<p:sld xmlns:a="http://schemas.openxmlformats.org/drawingml/2006/main" xmlns:r="http://schemas.openxmlformats.org/officeDocument/2006/relationships" xmlns:p="http://schemas.openxmlformats.org/presentationml/2006/main">
-  <p:cSld>
-    <p:spTree>
-      <p:nvGrpSpPr>
-        <p:cNvPr id="1" name=""/>
-        <p:cNvGrpSpPr/>
-        <p:nvPr/>
-      </p:nvGrpSpPr>
-      <p:grpSpPr>
-        <a:xfrm>
-          <a:off x="0" y="0"/>
-          <a:ext cx="0" cy="0"/>
-          <a:chOff x="0" y="0"/>
-          <a:chExt cx="0" cy="0"/>
-        </a:xfrm>
-      </p:grpSpPr>
-      <p:sp>
-        <p:nvSpPr>
-          <p:cNvPr id="2" name="Title 1">
-            <a:extLst>
-              <a:ext uri="{FF2B5EF4-FFF2-40B4-BE49-F238E27FC236}">
-                <a16:creationId xmlns:a16="http://schemas.microsoft.com/office/drawing/2014/main" id="{676E66B9-9460-4E55-9603-A12B052107B3}"/>
-              </a:ext>
-            </a:extLst>
-          </p:cNvPr>
-          <p:cNvSpPr>
-            <a:spLocks noGrp="1"/>
-          </p:cNvSpPr>
-          <p:nvPr>
-            <p:ph type="title"/>
-          </p:nvPr>
-        </p:nvSpPr>
-        <p:spPr/>
-        <p:txBody>
-          <a:bodyPr/>
-          <a:lstStyle/>
-          <a:p>
-            <a:endParaRPr lang="en-GB"/>
-          </a:p>
-        </p:txBody>
-      </p:sp>
-      <p:sp>
-        <p:nvSpPr>
-          <p:cNvPr id="3" name="Text Placeholder 2">
-            <a:extLst>
-              <a:ext uri="{FF2B5EF4-FFF2-40B4-BE49-F238E27FC236}">
-                <a16:creationId xmlns:a16="http://schemas.microsoft.com/office/drawing/2014/main" id="{4A539546-AA85-415B-902D-178146BF179B}"/>
-              </a:ext>
-            </a:extLst>
-          </p:cNvPr>
-          <p:cNvSpPr>
-            <a:spLocks noGrp="1"/>
-          </p:cNvSpPr>
-          <p:nvPr>
-            <p:ph type="body" idx="1"/>
-          </p:nvPr>
-        </p:nvSpPr>
-        <p:spPr/>
-        <p:txBody>
-          <a:bodyPr/>
-          <a:lstStyle/>
-          <a:p>
-            <a:endParaRPr lang="en-GB"/>
-          </a:p>
-        </p:txBody>
-      </p:sp>
-      <p:pic>
-        <p:nvPicPr>
-          <p:cNvPr id="7" name="Content Placeholder 6">
-            <a:extLst>
-              <a:ext uri="{FF2B5EF4-FFF2-40B4-BE49-F238E27FC236}">
-                <a16:creationId xmlns:a16="http://schemas.microsoft.com/office/drawing/2014/main" id="{88AFA9F9-17DF-4619-9055-40349D77E1A6}"/>
-              </a:ext>
-            </a:extLst>
-          </p:cNvPr>
-          <p:cNvPicPr>
-            <a:picLocks noGrp="1" noChangeAspect="1"/>
-          </p:cNvPicPr>
-          <p:nvPr>
-            <p:ph sz="half" idx="2"/>
-          </p:nvPr>
-        </p:nvPicPr>
-        <p:blipFill>
-          <a:blip r:embed="rId2"/>
-          <a:stretch>
-            <a:fillRect/>
-          </a:stretch>
-        </p:blipFill>
-        <p:spPr>
-          <a:xfrm>
-            <a:off x="1103313" y="2514600"/>
-            <a:ext cx="3452870" cy="3741738"/>
-          </a:xfrm>
-          <a:prstGeom prst="rect">
-            <a:avLst/>
-          </a:prstGeom>
-        </p:spPr>
-      </p:pic>
-      <p:sp>
-        <p:nvSpPr>
-          <p:cNvPr id="5" name="Text Placeholder 4">
-            <a:extLst>
-              <a:ext uri="{FF2B5EF4-FFF2-40B4-BE49-F238E27FC236}">
-                <a16:creationId xmlns:a16="http://schemas.microsoft.com/office/drawing/2014/main" id="{11850286-7421-4F22-B553-4AFB053BEF8E}"/>
-              </a:ext>
-            </a:extLst>
-          </p:cNvPr>
-          <p:cNvSpPr>
-            <a:spLocks noGrp="1"/>
-          </p:cNvSpPr>
-          <p:nvPr>
-            <p:ph type="body" sz="quarter" idx="3"/>
-          </p:nvPr>
-        </p:nvSpPr>
-        <p:spPr/>
-        <p:txBody>
-          <a:bodyPr/>
-          <a:lstStyle/>
-          <a:p>
-            <a:endParaRPr lang="en-GB"/>
-          </a:p>
-        </p:txBody>
-      </p:sp>
-      <p:pic>
-        <p:nvPicPr>
-          <p:cNvPr id="8" name="Content Placeholder 7">
-            <a:extLst>
-              <a:ext uri="{FF2B5EF4-FFF2-40B4-BE49-F238E27FC236}">
-                <a16:creationId xmlns:a16="http://schemas.microsoft.com/office/drawing/2014/main" id="{C4B43006-E746-47AF-867E-56CE4A7F161A}"/>
-              </a:ext>
-            </a:extLst>
-          </p:cNvPr>
-          <p:cNvPicPr>
-            <a:picLocks noGrp="1" noChangeAspect="1"/>
-          </p:cNvPicPr>
-          <p:nvPr>
-            <p:ph sz="quarter" idx="4"/>
-          </p:nvPr>
-        </p:nvPicPr>
-        <p:blipFill>
-          <a:blip r:embed="rId3"/>
-          <a:stretch>
-            <a:fillRect/>
-          </a:stretch>
-        </p:blipFill>
-        <p:spPr>
-          <a:xfrm>
-            <a:off x="6036929" y="2514600"/>
-            <a:ext cx="3631280" cy="3741738"/>
-          </a:xfrm>
-          <a:prstGeom prst="rect">
-            <a:avLst/>
-          </a:prstGeom>
-        </p:spPr>
-      </p:pic>
-      <p:pic>
-        <p:nvPicPr>
-          <p:cNvPr id="9" name="Picture 8">
-            <a:extLst>
-              <a:ext uri="{FF2B5EF4-FFF2-40B4-BE49-F238E27FC236}">
-                <a16:creationId xmlns:a16="http://schemas.microsoft.com/office/drawing/2014/main" id="{E8E626F6-B8C0-424F-82D0-B463DA4D6A8A}"/>
-              </a:ext>
-            </a:extLst>
-          </p:cNvPr>
-          <p:cNvPicPr>
-            <a:picLocks noChangeAspect="1"/>
-          </p:cNvPicPr>
-          <p:nvPr/>
-        </p:nvPicPr>
-        <p:blipFill>
-          <a:blip r:embed="rId4"/>
-          <a:stretch>
-            <a:fillRect/>
-          </a:stretch>
-        </p:blipFill>
-        <p:spPr>
-          <a:xfrm>
-            <a:off x="852359" y="646111"/>
-            <a:ext cx="7895004" cy="3703641"/>
-          </a:xfrm>
-          <a:prstGeom prst="rect">
-            <a:avLst/>
-          </a:prstGeom>
-        </p:spPr>
-      </p:pic>
-    </p:spTree>
-    <p:extLst>
-      <p:ext uri="{BB962C8B-B14F-4D97-AF65-F5344CB8AC3E}">
-        <p14:creationId xmlns:p14="http://schemas.microsoft.com/office/powerpoint/2010/main" val="3309860680"/>
       </p:ext>
     </p:extLst>
   </p:cSld>
@@ -6711,358 +6971,6 @@
       </p:grpSpPr>
       <p:sp>
         <p:nvSpPr>
-          <p:cNvPr id="2" name="Title 1">
-            <a:extLst>
-              <a:ext uri="{FF2B5EF4-FFF2-40B4-BE49-F238E27FC236}">
-                <a16:creationId xmlns:a16="http://schemas.microsoft.com/office/drawing/2014/main" id="{9480DF83-FCB8-4111-92E0-6856418DD544}"/>
-              </a:ext>
-            </a:extLst>
-          </p:cNvPr>
-          <p:cNvSpPr>
-            <a:spLocks noGrp="1"/>
-          </p:cNvSpPr>
-          <p:nvPr>
-            <p:ph type="title"/>
-          </p:nvPr>
-        </p:nvSpPr>
-        <p:spPr/>
-        <p:txBody>
-          <a:bodyPr/>
-          <a:lstStyle/>
-          <a:p>
-            <a:r>
-              <a:rPr lang="en-US" dirty="0"/>
-              <a:t>One file connected to multiple files </a:t>
-            </a:r>
-            <a:endParaRPr lang="en-GB" dirty="0"/>
-          </a:p>
-        </p:txBody>
-      </p:sp>
-      <p:sp>
-        <p:nvSpPr>
-          <p:cNvPr id="3" name="Text Placeholder 2">
-            <a:extLst>
-              <a:ext uri="{FF2B5EF4-FFF2-40B4-BE49-F238E27FC236}">
-                <a16:creationId xmlns:a16="http://schemas.microsoft.com/office/drawing/2014/main" id="{E0FCCF02-03B1-4FF0-A428-FF17F85EBE95}"/>
-              </a:ext>
-            </a:extLst>
-          </p:cNvPr>
-          <p:cNvSpPr>
-            <a:spLocks noGrp="1"/>
-          </p:cNvSpPr>
-          <p:nvPr>
-            <p:ph type="body" idx="1"/>
-          </p:nvPr>
-        </p:nvSpPr>
-        <p:spPr/>
-        <p:txBody>
-          <a:bodyPr/>
-          <a:lstStyle/>
-          <a:p>
-            <a:r>
-              <a:rPr lang="en-US" dirty="0" err="1"/>
-              <a:t>Index.php</a:t>
-            </a:r>
-            <a:endParaRPr lang="en-GB" dirty="0"/>
-          </a:p>
-        </p:txBody>
-      </p:sp>
-      <p:sp>
-        <p:nvSpPr>
-          <p:cNvPr id="4" name="Text Placeholder 3">
-            <a:extLst>
-              <a:ext uri="{FF2B5EF4-FFF2-40B4-BE49-F238E27FC236}">
-                <a16:creationId xmlns:a16="http://schemas.microsoft.com/office/drawing/2014/main" id="{784C0EC7-BE47-4430-899D-8CBFD7C27D8A}"/>
-              </a:ext>
-            </a:extLst>
-          </p:cNvPr>
-          <p:cNvSpPr>
-            <a:spLocks noGrp="1"/>
-          </p:cNvSpPr>
-          <p:nvPr>
-            <p:ph type="body" sz="half" idx="15"/>
-          </p:nvPr>
-        </p:nvSpPr>
-        <p:spPr/>
-        <p:txBody>
-          <a:bodyPr/>
-          <a:lstStyle/>
-          <a:p>
-            <a:endParaRPr lang="en-GB" dirty="0"/>
-          </a:p>
-        </p:txBody>
-      </p:sp>
-      <p:sp>
-        <p:nvSpPr>
-          <p:cNvPr id="5" name="Text Placeholder 4">
-            <a:extLst>
-              <a:ext uri="{FF2B5EF4-FFF2-40B4-BE49-F238E27FC236}">
-                <a16:creationId xmlns:a16="http://schemas.microsoft.com/office/drawing/2014/main" id="{AC903DC0-5FAA-46A7-B56C-1EF02D3E440B}"/>
-              </a:ext>
-            </a:extLst>
-          </p:cNvPr>
-          <p:cNvSpPr>
-            <a:spLocks noGrp="1"/>
-          </p:cNvSpPr>
-          <p:nvPr>
-            <p:ph type="body" sz="quarter" idx="3"/>
-          </p:nvPr>
-        </p:nvSpPr>
-        <p:spPr/>
-        <p:txBody>
-          <a:bodyPr/>
-          <a:lstStyle/>
-          <a:p>
-            <a:r>
-              <a:rPr lang="en-US" dirty="0" err="1"/>
-              <a:t>Header.php</a:t>
-            </a:r>
-            <a:endParaRPr lang="en-GB" dirty="0"/>
-          </a:p>
-        </p:txBody>
-      </p:sp>
-      <p:sp>
-        <p:nvSpPr>
-          <p:cNvPr id="6" name="Text Placeholder 5">
-            <a:extLst>
-              <a:ext uri="{FF2B5EF4-FFF2-40B4-BE49-F238E27FC236}">
-                <a16:creationId xmlns:a16="http://schemas.microsoft.com/office/drawing/2014/main" id="{5685CF4A-626D-4F53-8844-09ADDAEF7973}"/>
-              </a:ext>
-            </a:extLst>
-          </p:cNvPr>
-          <p:cNvSpPr>
-            <a:spLocks noGrp="1"/>
-          </p:cNvSpPr>
-          <p:nvPr>
-            <p:ph type="body" sz="half" idx="16"/>
-          </p:nvPr>
-        </p:nvSpPr>
-        <p:spPr/>
-        <p:txBody>
-          <a:bodyPr/>
-          <a:lstStyle/>
-          <a:p>
-            <a:endParaRPr lang="en-GB" dirty="0"/>
-          </a:p>
-        </p:txBody>
-      </p:sp>
-      <p:sp>
-        <p:nvSpPr>
-          <p:cNvPr id="7" name="Text Placeholder 6">
-            <a:extLst>
-              <a:ext uri="{FF2B5EF4-FFF2-40B4-BE49-F238E27FC236}">
-                <a16:creationId xmlns:a16="http://schemas.microsoft.com/office/drawing/2014/main" id="{74D629A1-BF0F-448E-8E5E-4CB7998F93F2}"/>
-              </a:ext>
-            </a:extLst>
-          </p:cNvPr>
-          <p:cNvSpPr>
-            <a:spLocks noGrp="1"/>
-          </p:cNvSpPr>
-          <p:nvPr>
-            <p:ph type="body" sz="quarter" idx="13"/>
-          </p:nvPr>
-        </p:nvSpPr>
-        <p:spPr/>
-        <p:txBody>
-          <a:bodyPr/>
-          <a:lstStyle/>
-          <a:p>
-            <a:r>
-              <a:rPr lang="en-US" dirty="0" err="1"/>
-              <a:t>Signup.php</a:t>
-            </a:r>
-            <a:endParaRPr lang="en-GB" dirty="0"/>
-          </a:p>
-        </p:txBody>
-      </p:sp>
-      <p:sp>
-        <p:nvSpPr>
-          <p:cNvPr id="8" name="Text Placeholder 7">
-            <a:extLst>
-              <a:ext uri="{FF2B5EF4-FFF2-40B4-BE49-F238E27FC236}">
-                <a16:creationId xmlns:a16="http://schemas.microsoft.com/office/drawing/2014/main" id="{A25E0B40-E263-4971-847B-AF131CFB431E}"/>
-              </a:ext>
-            </a:extLst>
-          </p:cNvPr>
-          <p:cNvSpPr>
-            <a:spLocks noGrp="1"/>
-          </p:cNvSpPr>
-          <p:nvPr>
-            <p:ph type="body" sz="half" idx="17"/>
-          </p:nvPr>
-        </p:nvSpPr>
-        <p:spPr/>
-        <p:txBody>
-          <a:bodyPr/>
-          <a:lstStyle/>
-          <a:p>
-            <a:endParaRPr lang="en-GB"/>
-          </a:p>
-        </p:txBody>
-      </p:sp>
-      <p:pic>
-        <p:nvPicPr>
-          <p:cNvPr id="9" name="Content Placeholder 6">
-            <a:extLst>
-              <a:ext uri="{FF2B5EF4-FFF2-40B4-BE49-F238E27FC236}">
-                <a16:creationId xmlns:a16="http://schemas.microsoft.com/office/drawing/2014/main" id="{D94BB804-EDAD-49F6-9C7D-3833561FFD40}"/>
-              </a:ext>
-            </a:extLst>
-          </p:cNvPr>
-          <p:cNvPicPr>
-            <a:picLocks noGrp="1" noChangeAspect="1"/>
-          </p:cNvPicPr>
-          <p:nvPr>
-            <p:ph sz="half" idx="2"/>
-          </p:nvPr>
-        </p:nvPicPr>
-        <p:blipFill>
-          <a:blip r:embed="rId2"/>
-          <a:stretch>
-            <a:fillRect/>
-          </a:stretch>
-        </p:blipFill>
-        <p:spPr>
-          <a:xfrm>
-            <a:off x="718349" y="2663544"/>
-            <a:ext cx="2833675" cy="3741738"/>
-          </a:xfrm>
-          <a:prstGeom prst="rect">
-            <a:avLst/>
-          </a:prstGeom>
-        </p:spPr>
-      </p:pic>
-      <p:pic>
-        <p:nvPicPr>
-          <p:cNvPr id="10" name="Content Placeholder 7">
-            <a:extLst>
-              <a:ext uri="{FF2B5EF4-FFF2-40B4-BE49-F238E27FC236}">
-                <a16:creationId xmlns:a16="http://schemas.microsoft.com/office/drawing/2014/main" id="{D29CD6BF-D6C3-4C64-AED2-53C5FF2B6781}"/>
-              </a:ext>
-            </a:extLst>
-          </p:cNvPr>
-          <p:cNvPicPr>
-            <a:picLocks noGrp="1" noChangeAspect="1"/>
-          </p:cNvPicPr>
-          <p:nvPr>
-            <p:ph sz="quarter" idx="4"/>
-          </p:nvPr>
-        </p:nvPicPr>
-        <p:blipFill>
-          <a:blip r:embed="rId3"/>
-          <a:stretch>
-            <a:fillRect/>
-          </a:stretch>
-        </p:blipFill>
-        <p:spPr>
-          <a:xfrm>
-            <a:off x="3883659" y="2663544"/>
-            <a:ext cx="2833675" cy="3741738"/>
-          </a:xfrm>
-          <a:prstGeom prst="rect">
-            <a:avLst/>
-          </a:prstGeom>
-        </p:spPr>
-      </p:pic>
-      <p:pic>
-        <p:nvPicPr>
-          <p:cNvPr id="11" name="Picture 10">
-            <a:extLst>
-              <a:ext uri="{FF2B5EF4-FFF2-40B4-BE49-F238E27FC236}">
-                <a16:creationId xmlns:a16="http://schemas.microsoft.com/office/drawing/2014/main" id="{A55BBF44-99C3-47F1-A1BB-CFD1BFFC9CB6}"/>
-              </a:ext>
-            </a:extLst>
-          </p:cNvPr>
-          <p:cNvPicPr>
-            <a:picLocks noChangeAspect="1"/>
-          </p:cNvPicPr>
-          <p:nvPr/>
-        </p:nvPicPr>
-        <p:blipFill>
-          <a:blip r:embed="rId4"/>
-          <a:stretch>
-            <a:fillRect/>
-          </a:stretch>
-        </p:blipFill>
-        <p:spPr>
-          <a:xfrm>
-            <a:off x="6830454" y="2660617"/>
-            <a:ext cx="5198790" cy="3703641"/>
-          </a:xfrm>
-          <a:prstGeom prst="rect">
-            <a:avLst/>
-          </a:prstGeom>
-        </p:spPr>
-      </p:pic>
-      <p:cxnSp>
-        <p:nvCxnSpPr>
-          <p:cNvPr id="13" name="Straight Connector 12">
-            <a:extLst>
-              <a:ext uri="{FF2B5EF4-FFF2-40B4-BE49-F238E27FC236}">
-                <a16:creationId xmlns:a16="http://schemas.microsoft.com/office/drawing/2014/main" id="{C337FAF0-560D-442D-85A3-1B8F810497BC}"/>
-              </a:ext>
-            </a:extLst>
-          </p:cNvPr>
-          <p:cNvCxnSpPr/>
-          <p:nvPr/>
-        </p:nvCxnSpPr>
-        <p:spPr>
-          <a:xfrm>
-            <a:off x="4039340" y="5850384"/>
-            <a:ext cx="1521400" cy="0"/>
-          </a:xfrm>
-          <a:prstGeom prst="line">
-            <a:avLst/>
-          </a:prstGeom>
-          <a:ln w="38100"/>
-        </p:spPr>
-        <p:style>
-          <a:lnRef idx="1">
-            <a:schemeClr val="accent1"/>
-          </a:lnRef>
-          <a:fillRef idx="0">
-            <a:schemeClr val="accent1"/>
-          </a:fillRef>
-          <a:effectRef idx="0">
-            <a:schemeClr val="accent1"/>
-          </a:effectRef>
-          <a:fontRef idx="minor">
-            <a:schemeClr val="tx1"/>
-          </a:fontRef>
-        </p:style>
-      </p:cxnSp>
-    </p:spTree>
-    <p:extLst>
-      <p:ext uri="{BB962C8B-B14F-4D97-AF65-F5344CB8AC3E}">
-        <p14:creationId xmlns:p14="http://schemas.microsoft.com/office/powerpoint/2010/main" val="763074300"/>
-      </p:ext>
-    </p:extLst>
-  </p:cSld>
-  <p:clrMapOvr>
-    <a:masterClrMapping/>
-  </p:clrMapOvr>
-</p:sld>
-</file>
-
-<file path=ppt/slides/slide14.xml><?xml version="1.0" encoding="utf-8"?>
-<p:sld xmlns:a="http://schemas.openxmlformats.org/drawingml/2006/main" xmlns:r="http://schemas.openxmlformats.org/officeDocument/2006/relationships" xmlns:p="http://schemas.openxmlformats.org/presentationml/2006/main">
-  <p:cSld>
-    <p:spTree>
-      <p:nvGrpSpPr>
-        <p:cNvPr id="1" name=""/>
-        <p:cNvGrpSpPr/>
-        <p:nvPr/>
-      </p:nvGrpSpPr>
-      <p:grpSpPr>
-        <a:xfrm>
-          <a:off x="0" y="0"/>
-          <a:ext cx="0" cy="0"/>
-          <a:chOff x="0" y="0"/>
-          <a:chExt cx="0" cy="0"/>
-        </a:xfrm>
-      </p:grpSpPr>
-      <p:sp>
-        <p:nvSpPr>
           <p:cNvPr id="5" name="Text Placeholder 4">
             <a:extLst>
               <a:ext uri="{FF2B5EF4-FFF2-40B4-BE49-F238E27FC236}">
@@ -7092,6 +7000,35 @@
               <a:rPr lang="en-US" sz="5400" dirty="0"/>
               <a:t>Thank You!</a:t>
             </a:r>
+          </a:p>
+        </p:txBody>
+      </p:sp>
+      <p:sp>
+        <p:nvSpPr>
+          <p:cNvPr id="2" name="Slide Number Placeholder 1">
+            <a:extLst>
+              <a:ext uri="{FF2B5EF4-FFF2-40B4-BE49-F238E27FC236}">
+                <a16:creationId xmlns:a16="http://schemas.microsoft.com/office/drawing/2014/main" id="{69EE1EE7-87E8-C6CE-A84C-5AAF11027FE5}"/>
+              </a:ext>
+            </a:extLst>
+          </p:cNvPr>
+          <p:cNvSpPr>
+            <a:spLocks noGrp="1"/>
+          </p:cNvSpPr>
+          <p:nvPr>
+            <p:ph type="sldNum" sz="quarter" idx="12"/>
+          </p:nvPr>
+        </p:nvSpPr>
+        <p:spPr/>
+        <p:txBody>
+          <a:bodyPr/>
+          <a:lstStyle/>
+          <a:p>
+            <a:fld id="{452661BF-F4F2-4852-B4BE-7723DA5457E7}" type="slidenum">
+              <a:rPr lang="en-GB" smtClean="0"/>
+              <a:t>13</a:t>
+            </a:fld>
+            <a:endParaRPr lang="en-GB"/>
           </a:p>
         </p:txBody>
       </p:sp>
@@ -7196,6 +7133,35 @@
           </a:p>
           <a:p>
             <a:endParaRPr lang="en-GB" dirty="0"/>
+          </a:p>
+        </p:txBody>
+      </p:sp>
+      <p:sp>
+        <p:nvSpPr>
+          <p:cNvPr id="4" name="Slide Number Placeholder 3">
+            <a:extLst>
+              <a:ext uri="{FF2B5EF4-FFF2-40B4-BE49-F238E27FC236}">
+                <a16:creationId xmlns:a16="http://schemas.microsoft.com/office/drawing/2014/main" id="{CF58A79D-EEE3-A6E8-27AB-C8BCF16DA9DD}"/>
+              </a:ext>
+            </a:extLst>
+          </p:cNvPr>
+          <p:cNvSpPr>
+            <a:spLocks noGrp="1"/>
+          </p:cNvSpPr>
+          <p:nvPr>
+            <p:ph type="sldNum" sz="quarter" idx="12"/>
+          </p:nvPr>
+        </p:nvSpPr>
+        <p:spPr/>
+        <p:txBody>
+          <a:bodyPr/>
+          <a:lstStyle/>
+          <a:p>
+            <a:fld id="{452661BF-F4F2-4852-B4BE-7723DA5457E7}" type="slidenum">
+              <a:rPr lang="en-GB" smtClean="0"/>
+              <a:t>2</a:t>
+            </a:fld>
+            <a:endParaRPr lang="en-GB"/>
           </a:p>
         </p:txBody>
       </p:sp>
@@ -7383,6 +7349,35 @@
           </a:p>
         </p:txBody>
       </p:sp>
+      <p:sp>
+        <p:nvSpPr>
+          <p:cNvPr id="4" name="Slide Number Placeholder 3">
+            <a:extLst>
+              <a:ext uri="{FF2B5EF4-FFF2-40B4-BE49-F238E27FC236}">
+                <a16:creationId xmlns:a16="http://schemas.microsoft.com/office/drawing/2014/main" id="{4E67DAE5-8954-B62B-FF46-A51D415E0602}"/>
+              </a:ext>
+            </a:extLst>
+          </p:cNvPr>
+          <p:cNvSpPr>
+            <a:spLocks noGrp="1"/>
+          </p:cNvSpPr>
+          <p:nvPr>
+            <p:ph type="sldNum" sz="quarter" idx="12"/>
+          </p:nvPr>
+        </p:nvSpPr>
+        <p:spPr/>
+        <p:txBody>
+          <a:bodyPr/>
+          <a:lstStyle/>
+          <a:p>
+            <a:fld id="{452661BF-F4F2-4852-B4BE-7723DA5457E7}" type="slidenum">
+              <a:rPr lang="en-GB" smtClean="0"/>
+              <a:t>3</a:t>
+            </a:fld>
+            <a:endParaRPr lang="en-GB"/>
+          </a:p>
+        </p:txBody>
+      </p:sp>
     </p:spTree>
     <p:extLst>
       <p:ext uri="{BB962C8B-B14F-4D97-AF65-F5344CB8AC3E}">
@@ -7397,6 +7392,452 @@
 </file>
 
 <file path=ppt/slides/slide4.xml><?xml version="1.0" encoding="utf-8"?>
+<p:sld xmlns:a="http://schemas.openxmlformats.org/drawingml/2006/main" xmlns:r="http://schemas.openxmlformats.org/officeDocument/2006/relationships" xmlns:p="http://schemas.openxmlformats.org/presentationml/2006/main">
+  <p:cSld>
+    <p:spTree>
+      <p:nvGrpSpPr>
+        <p:cNvPr id="1" name="">
+          <a:extLst>
+            <a:ext uri="{FF2B5EF4-FFF2-40B4-BE49-F238E27FC236}">
+              <a16:creationId xmlns:a16="http://schemas.microsoft.com/office/drawing/2014/main" id="{78BF91BA-0164-CF68-B0B4-0E32AD6CC171}"/>
+            </a:ext>
+          </a:extLst>
+        </p:cNvPr>
+        <p:cNvGrpSpPr/>
+        <p:nvPr/>
+      </p:nvGrpSpPr>
+      <p:grpSpPr>
+        <a:xfrm>
+          <a:off x="0" y="0"/>
+          <a:ext cx="0" cy="0"/>
+          <a:chOff x="0" y="0"/>
+          <a:chExt cx="0" cy="0"/>
+        </a:xfrm>
+      </p:grpSpPr>
+      <p:sp>
+        <p:nvSpPr>
+          <p:cNvPr id="2" name="Title 1">
+            <a:extLst>
+              <a:ext uri="{FF2B5EF4-FFF2-40B4-BE49-F238E27FC236}">
+                <a16:creationId xmlns:a16="http://schemas.microsoft.com/office/drawing/2014/main" id="{58D74547-7DCE-EF29-36E0-0F0DE27262F6}"/>
+              </a:ext>
+            </a:extLst>
+          </p:cNvPr>
+          <p:cNvSpPr>
+            <a:spLocks noGrp="1"/>
+          </p:cNvSpPr>
+          <p:nvPr>
+            <p:ph type="title"/>
+          </p:nvPr>
+        </p:nvSpPr>
+        <p:spPr/>
+        <p:txBody>
+          <a:bodyPr/>
+          <a:lstStyle/>
+          <a:p>
+            <a:r>
+              <a:rPr lang="en-US" b="1" u="sng" dirty="0"/>
+              <a:t>Functional Requirement</a:t>
+            </a:r>
+            <a:endParaRPr lang="en-GB" b="1" u="sng" dirty="0"/>
+          </a:p>
+        </p:txBody>
+      </p:sp>
+      <p:sp>
+        <p:nvSpPr>
+          <p:cNvPr id="3" name="Content Placeholder 2">
+            <a:extLst>
+              <a:ext uri="{FF2B5EF4-FFF2-40B4-BE49-F238E27FC236}">
+                <a16:creationId xmlns:a16="http://schemas.microsoft.com/office/drawing/2014/main" id="{65F68C36-055D-75ED-053A-990070A0E8E6}"/>
+              </a:ext>
+            </a:extLst>
+          </p:cNvPr>
+          <p:cNvSpPr>
+            <a:spLocks noGrp="1"/>
+          </p:cNvSpPr>
+          <p:nvPr>
+            <p:ph idx="1"/>
+          </p:nvPr>
+        </p:nvSpPr>
+        <p:spPr/>
+        <p:txBody>
+          <a:bodyPr/>
+          <a:lstStyle/>
+          <a:p>
+            <a:pPr marL="342900" marR="0" lvl="0" indent="-342900" algn="just">
+              <a:lnSpc>
+                <a:spcPct val="150000"/>
+              </a:lnSpc>
+              <a:spcBef>
+                <a:spcPts val="1500"/>
+              </a:spcBef>
+              <a:buFont typeface="Symbol" panose="05050102010706020507" pitchFamily="18" charset="2"/>
+              <a:buChar char=""/>
+            </a:pPr>
+            <a:r>
+              <a:rPr lang="en-US" sz="1800" dirty="0">
+                <a:effectLst/>
+                <a:latin typeface="Times New Roman" panose="02020603050405020304" pitchFamily="18" charset="0"/>
+                <a:ea typeface="Times New Roman" panose="02020603050405020304" pitchFamily="18" charset="0"/>
+              </a:rPr>
+              <a:t>User Registration and Authentication</a:t>
+            </a:r>
+          </a:p>
+          <a:p>
+            <a:pPr algn="just">
+              <a:lnSpc>
+                <a:spcPct val="150000"/>
+              </a:lnSpc>
+              <a:spcBef>
+                <a:spcPts val="1500"/>
+              </a:spcBef>
+              <a:buFont typeface="Symbol" panose="05050102010706020507" pitchFamily="18" charset="2"/>
+              <a:buChar char=""/>
+            </a:pPr>
+            <a:r>
+              <a:rPr lang="en-US" sz="1800" dirty="0">
+                <a:effectLst/>
+                <a:latin typeface="Times New Roman" panose="02020603050405020304" pitchFamily="18" charset="0"/>
+                <a:ea typeface="Times New Roman" panose="02020603050405020304" pitchFamily="18" charset="0"/>
+              </a:rPr>
+              <a:t>User Profiles</a:t>
+            </a:r>
+          </a:p>
+          <a:p>
+            <a:pPr algn="just">
+              <a:lnSpc>
+                <a:spcPct val="150000"/>
+              </a:lnSpc>
+              <a:spcBef>
+                <a:spcPts val="1500"/>
+              </a:spcBef>
+              <a:buFont typeface="Symbol" panose="05050102010706020507" pitchFamily="18" charset="2"/>
+              <a:buChar char=""/>
+            </a:pPr>
+            <a:r>
+              <a:rPr lang="en-US" sz="1800" dirty="0">
+                <a:effectLst/>
+                <a:latin typeface="Times New Roman" panose="02020603050405020304" pitchFamily="18" charset="0"/>
+                <a:ea typeface="Times New Roman" panose="02020603050405020304" pitchFamily="18" charset="0"/>
+              </a:rPr>
+              <a:t>Job Posting</a:t>
+            </a:r>
+          </a:p>
+          <a:p>
+            <a:pPr algn="just">
+              <a:lnSpc>
+                <a:spcPct val="150000"/>
+              </a:lnSpc>
+              <a:spcBef>
+                <a:spcPts val="1500"/>
+              </a:spcBef>
+              <a:buFont typeface="Symbol" panose="05050102010706020507" pitchFamily="18" charset="2"/>
+              <a:buChar char=""/>
+            </a:pPr>
+            <a:r>
+              <a:rPr lang="en-US" sz="1800" dirty="0">
+                <a:effectLst/>
+                <a:latin typeface="Times New Roman" panose="02020603050405020304" pitchFamily="18" charset="0"/>
+                <a:ea typeface="Times New Roman" panose="02020603050405020304" pitchFamily="18" charset="0"/>
+              </a:rPr>
+              <a:t>Payment Integration</a:t>
+            </a:r>
+          </a:p>
+          <a:p>
+            <a:pPr marL="342900" marR="0" lvl="0" indent="-342900" algn="just">
+              <a:lnSpc>
+                <a:spcPct val="150000"/>
+              </a:lnSpc>
+              <a:spcBef>
+                <a:spcPts val="1500"/>
+              </a:spcBef>
+              <a:buFont typeface="Symbol" panose="05050102010706020507" pitchFamily="18" charset="2"/>
+              <a:buChar char=""/>
+            </a:pPr>
+            <a:endParaRPr lang="en-US" sz="1800" b="1" dirty="0">
+              <a:latin typeface="Times New Roman" panose="02020603050405020304" pitchFamily="18" charset="0"/>
+              <a:ea typeface="Times New Roman" panose="02020603050405020304" pitchFamily="18" charset="0"/>
+            </a:endParaRPr>
+          </a:p>
+        </p:txBody>
+      </p:sp>
+      <p:sp>
+        <p:nvSpPr>
+          <p:cNvPr id="4" name="Slide Number Placeholder 3">
+            <a:extLst>
+              <a:ext uri="{FF2B5EF4-FFF2-40B4-BE49-F238E27FC236}">
+                <a16:creationId xmlns:a16="http://schemas.microsoft.com/office/drawing/2014/main" id="{D9ABE919-4DF3-5EFC-7B0B-B43DFCE5C211}"/>
+              </a:ext>
+            </a:extLst>
+          </p:cNvPr>
+          <p:cNvSpPr>
+            <a:spLocks noGrp="1"/>
+          </p:cNvSpPr>
+          <p:nvPr>
+            <p:ph type="sldNum" sz="quarter" idx="12"/>
+          </p:nvPr>
+        </p:nvSpPr>
+        <p:spPr/>
+        <p:txBody>
+          <a:bodyPr/>
+          <a:lstStyle/>
+          <a:p>
+            <a:fld id="{452661BF-F4F2-4852-B4BE-7723DA5457E7}" type="slidenum">
+              <a:rPr lang="en-GB" smtClean="0"/>
+              <a:t>4</a:t>
+            </a:fld>
+            <a:endParaRPr lang="en-GB"/>
+          </a:p>
+        </p:txBody>
+      </p:sp>
+    </p:spTree>
+    <p:extLst>
+      <p:ext uri="{BB962C8B-B14F-4D97-AF65-F5344CB8AC3E}">
+        <p14:creationId xmlns:p14="http://schemas.microsoft.com/office/powerpoint/2010/main" val="2938886287"/>
+      </p:ext>
+    </p:extLst>
+  </p:cSld>
+  <p:clrMapOvr>
+    <a:masterClrMapping/>
+  </p:clrMapOvr>
+</p:sld>
+</file>
+
+<file path=ppt/slides/slide5.xml><?xml version="1.0" encoding="utf-8"?>
+<p:sld xmlns:a="http://schemas.openxmlformats.org/drawingml/2006/main" xmlns:r="http://schemas.openxmlformats.org/officeDocument/2006/relationships" xmlns:p="http://schemas.openxmlformats.org/presentationml/2006/main">
+  <p:cSld>
+    <p:spTree>
+      <p:nvGrpSpPr>
+        <p:cNvPr id="1" name="">
+          <a:extLst>
+            <a:ext uri="{FF2B5EF4-FFF2-40B4-BE49-F238E27FC236}">
+              <a16:creationId xmlns:a16="http://schemas.microsoft.com/office/drawing/2014/main" id="{5A2833D1-7C73-C738-C330-6BC9E514188C}"/>
+            </a:ext>
+          </a:extLst>
+        </p:cNvPr>
+        <p:cNvGrpSpPr/>
+        <p:nvPr/>
+      </p:nvGrpSpPr>
+      <p:grpSpPr>
+        <a:xfrm>
+          <a:off x="0" y="0"/>
+          <a:ext cx="0" cy="0"/>
+          <a:chOff x="0" y="0"/>
+          <a:chExt cx="0" cy="0"/>
+        </a:xfrm>
+      </p:grpSpPr>
+      <p:sp>
+        <p:nvSpPr>
+          <p:cNvPr id="2" name="Title 1">
+            <a:extLst>
+              <a:ext uri="{FF2B5EF4-FFF2-40B4-BE49-F238E27FC236}">
+                <a16:creationId xmlns:a16="http://schemas.microsoft.com/office/drawing/2014/main" id="{6410C199-5666-93EA-04CA-D9CA6179283E}"/>
+              </a:ext>
+            </a:extLst>
+          </p:cNvPr>
+          <p:cNvSpPr>
+            <a:spLocks noGrp="1"/>
+          </p:cNvSpPr>
+          <p:nvPr>
+            <p:ph type="title"/>
+          </p:nvPr>
+        </p:nvSpPr>
+        <p:spPr/>
+        <p:txBody>
+          <a:bodyPr/>
+          <a:lstStyle/>
+          <a:p>
+            <a:r>
+              <a:rPr lang="en-US" b="1" u="sng" dirty="0"/>
+              <a:t>Non-Functional Requirement</a:t>
+            </a:r>
+            <a:endParaRPr lang="en-GB" b="1" u="sng" dirty="0"/>
+          </a:p>
+        </p:txBody>
+      </p:sp>
+      <p:sp>
+        <p:nvSpPr>
+          <p:cNvPr id="3" name="Content Placeholder 2">
+            <a:extLst>
+              <a:ext uri="{FF2B5EF4-FFF2-40B4-BE49-F238E27FC236}">
+                <a16:creationId xmlns:a16="http://schemas.microsoft.com/office/drawing/2014/main" id="{66487A88-C484-C266-E0BA-42CEF5438A03}"/>
+              </a:ext>
+            </a:extLst>
+          </p:cNvPr>
+          <p:cNvSpPr>
+            <a:spLocks noGrp="1"/>
+          </p:cNvSpPr>
+          <p:nvPr>
+            <p:ph idx="1"/>
+          </p:nvPr>
+        </p:nvSpPr>
+        <p:spPr/>
+        <p:txBody>
+          <a:bodyPr>
+            <a:normAutofit/>
+          </a:bodyPr>
+          <a:lstStyle/>
+          <a:p>
+            <a:pPr marL="342900" marR="0" lvl="0" indent="-342900" algn="just">
+              <a:lnSpc>
+                <a:spcPct val="150000"/>
+              </a:lnSpc>
+              <a:spcBef>
+                <a:spcPts val="1500"/>
+              </a:spcBef>
+              <a:buFont typeface="Symbol" panose="05050102010706020507" pitchFamily="18" charset="2"/>
+              <a:buChar char=""/>
+            </a:pPr>
+            <a:r>
+              <a:rPr lang="en-US" sz="1800" dirty="0">
+                <a:effectLst/>
+                <a:latin typeface="Times New Roman" panose="02020603050405020304" pitchFamily="18" charset="0"/>
+                <a:ea typeface="Times New Roman" panose="02020603050405020304" pitchFamily="18" charset="0"/>
+              </a:rPr>
+              <a:t>Performance</a:t>
+            </a:r>
+          </a:p>
+          <a:p>
+            <a:pPr algn="just">
+              <a:lnSpc>
+                <a:spcPct val="150000"/>
+              </a:lnSpc>
+              <a:spcBef>
+                <a:spcPts val="1500"/>
+              </a:spcBef>
+              <a:buFont typeface="Symbol" panose="05050102010706020507" pitchFamily="18" charset="2"/>
+              <a:buChar char=""/>
+            </a:pPr>
+            <a:r>
+              <a:rPr lang="en-US" sz="1800" dirty="0">
+                <a:effectLst/>
+                <a:latin typeface="Times New Roman" panose="02020603050405020304" pitchFamily="18" charset="0"/>
+                <a:ea typeface="Times New Roman" panose="02020603050405020304" pitchFamily="18" charset="0"/>
+              </a:rPr>
+              <a:t>User Scalability</a:t>
+            </a:r>
+          </a:p>
+          <a:p>
+            <a:pPr algn="just">
+              <a:lnSpc>
+                <a:spcPct val="150000"/>
+              </a:lnSpc>
+              <a:spcBef>
+                <a:spcPts val="1500"/>
+              </a:spcBef>
+              <a:buFont typeface="Symbol" panose="05050102010706020507" pitchFamily="18" charset="2"/>
+              <a:buChar char=""/>
+            </a:pPr>
+            <a:r>
+              <a:rPr lang="en-US" sz="1800" dirty="0">
+                <a:effectLst/>
+                <a:latin typeface="Times New Roman" panose="02020603050405020304" pitchFamily="18" charset="0"/>
+                <a:ea typeface="Times New Roman" panose="02020603050405020304" pitchFamily="18" charset="0"/>
+              </a:rPr>
+              <a:t>Usability</a:t>
+            </a:r>
+          </a:p>
+          <a:p>
+            <a:pPr algn="just">
+              <a:lnSpc>
+                <a:spcPct val="150000"/>
+              </a:lnSpc>
+              <a:spcBef>
+                <a:spcPts val="1500"/>
+              </a:spcBef>
+              <a:buFont typeface="Symbol" panose="05050102010706020507" pitchFamily="18" charset="2"/>
+              <a:buChar char=""/>
+            </a:pPr>
+            <a:r>
+              <a:rPr lang="en-US" sz="1800" dirty="0">
+                <a:effectLst/>
+                <a:latin typeface="Times New Roman" panose="02020603050405020304" pitchFamily="18" charset="0"/>
+                <a:ea typeface="Times New Roman" panose="02020603050405020304" pitchFamily="18" charset="0"/>
+              </a:rPr>
+              <a:t>Maintainability</a:t>
+            </a:r>
+          </a:p>
+          <a:p>
+            <a:pPr algn="just">
+              <a:lnSpc>
+                <a:spcPct val="150000"/>
+              </a:lnSpc>
+              <a:spcBef>
+                <a:spcPts val="1500"/>
+              </a:spcBef>
+              <a:buFont typeface="Symbol" panose="05050102010706020507" pitchFamily="18" charset="2"/>
+              <a:buChar char=""/>
+            </a:pPr>
+            <a:r>
+              <a:rPr lang="en-US" sz="1800" dirty="0">
+                <a:effectLst/>
+                <a:latin typeface="Times New Roman" panose="02020603050405020304" pitchFamily="18" charset="0"/>
+                <a:ea typeface="Times New Roman" panose="02020603050405020304" pitchFamily="18" charset="0"/>
+              </a:rPr>
+              <a:t>Security and Data Privacy</a:t>
+            </a:r>
+          </a:p>
+          <a:p>
+            <a:pPr marL="342900" marR="0" lvl="0" indent="-342900" algn="just">
+              <a:lnSpc>
+                <a:spcPct val="150000"/>
+              </a:lnSpc>
+              <a:spcBef>
+                <a:spcPts val="1500"/>
+              </a:spcBef>
+              <a:buFont typeface="Symbol" panose="05050102010706020507" pitchFamily="18" charset="2"/>
+              <a:buChar char=""/>
+            </a:pPr>
+            <a:endParaRPr lang="en-US" sz="1800" b="1" dirty="0">
+              <a:latin typeface="Times New Roman" panose="02020603050405020304" pitchFamily="18" charset="0"/>
+              <a:ea typeface="Times New Roman" panose="02020603050405020304" pitchFamily="18" charset="0"/>
+            </a:endParaRPr>
+          </a:p>
+        </p:txBody>
+      </p:sp>
+      <p:sp>
+        <p:nvSpPr>
+          <p:cNvPr id="4" name="Slide Number Placeholder 3">
+            <a:extLst>
+              <a:ext uri="{FF2B5EF4-FFF2-40B4-BE49-F238E27FC236}">
+                <a16:creationId xmlns:a16="http://schemas.microsoft.com/office/drawing/2014/main" id="{2754C97E-F621-C064-F20A-0985DC96E1C6}"/>
+              </a:ext>
+            </a:extLst>
+          </p:cNvPr>
+          <p:cNvSpPr>
+            <a:spLocks noGrp="1"/>
+          </p:cNvSpPr>
+          <p:nvPr>
+            <p:ph type="sldNum" sz="quarter" idx="12"/>
+          </p:nvPr>
+        </p:nvSpPr>
+        <p:spPr/>
+        <p:txBody>
+          <a:bodyPr/>
+          <a:lstStyle/>
+          <a:p>
+            <a:fld id="{452661BF-F4F2-4852-B4BE-7723DA5457E7}" type="slidenum">
+              <a:rPr lang="en-GB" smtClean="0"/>
+              <a:t>5</a:t>
+            </a:fld>
+            <a:endParaRPr lang="en-GB"/>
+          </a:p>
+        </p:txBody>
+      </p:sp>
+    </p:spTree>
+    <p:extLst>
+      <p:ext uri="{BB962C8B-B14F-4D97-AF65-F5344CB8AC3E}">
+        <p14:creationId xmlns:p14="http://schemas.microsoft.com/office/powerpoint/2010/main" val="1772096283"/>
+      </p:ext>
+    </p:extLst>
+  </p:cSld>
+  <p:clrMapOvr>
+    <a:masterClrMapping/>
+  </p:clrMapOvr>
+</p:sld>
+</file>
+
+<file path=ppt/slides/slide6.xml><?xml version="1.0" encoding="utf-8"?>
 <p:sld xmlns:a="http://schemas.openxmlformats.org/drawingml/2006/main" xmlns:r="http://schemas.openxmlformats.org/officeDocument/2006/relationships" xmlns:p="http://schemas.openxmlformats.org/presentationml/2006/main">
   <p:cSld>
     <p:spTree>
@@ -7531,6 +7972,35 @@
           </a:p>
         </p:txBody>
       </p:sp>
+      <p:sp>
+        <p:nvSpPr>
+          <p:cNvPr id="3" name="Slide Number Placeholder 2">
+            <a:extLst>
+              <a:ext uri="{FF2B5EF4-FFF2-40B4-BE49-F238E27FC236}">
+                <a16:creationId xmlns:a16="http://schemas.microsoft.com/office/drawing/2014/main" id="{C18B6302-D0C5-BE36-F5F9-3F8A4BBE8067}"/>
+              </a:ext>
+            </a:extLst>
+          </p:cNvPr>
+          <p:cNvSpPr>
+            <a:spLocks noGrp="1"/>
+          </p:cNvSpPr>
+          <p:nvPr>
+            <p:ph type="sldNum" sz="quarter" idx="12"/>
+          </p:nvPr>
+        </p:nvSpPr>
+        <p:spPr/>
+        <p:txBody>
+          <a:bodyPr/>
+          <a:lstStyle/>
+          <a:p>
+            <a:fld id="{452661BF-F4F2-4852-B4BE-7723DA5457E7}" type="slidenum">
+              <a:rPr lang="en-GB" smtClean="0"/>
+              <a:t>6</a:t>
+            </a:fld>
+            <a:endParaRPr lang="en-GB"/>
+          </a:p>
+        </p:txBody>
+      </p:sp>
     </p:spTree>
     <p:extLst>
       <p:ext uri="{BB962C8B-B14F-4D97-AF65-F5344CB8AC3E}">
@@ -7544,7 +8014,7 @@
 </p:sld>
 </file>
 
-<file path=ppt/slides/slide5.xml><?xml version="1.0" encoding="utf-8"?>
+<file path=ppt/slides/slide7.xml><?xml version="1.0" encoding="utf-8"?>
 <p:sld xmlns:a="http://schemas.openxmlformats.org/drawingml/2006/main" xmlns:r="http://schemas.openxmlformats.org/officeDocument/2006/relationships" xmlns:p="http://schemas.openxmlformats.org/presentationml/2006/main">
   <p:cSld>
     <p:spTree>
@@ -7769,6 +8239,35 @@
           </a:p>
         </p:txBody>
       </p:sp>
+      <p:sp>
+        <p:nvSpPr>
+          <p:cNvPr id="4" name="Slide Number Placeholder 3">
+            <a:extLst>
+              <a:ext uri="{FF2B5EF4-FFF2-40B4-BE49-F238E27FC236}">
+                <a16:creationId xmlns:a16="http://schemas.microsoft.com/office/drawing/2014/main" id="{CFB5CEFD-8EE4-EDFE-26D2-5B40FCD56FE2}"/>
+              </a:ext>
+            </a:extLst>
+          </p:cNvPr>
+          <p:cNvSpPr>
+            <a:spLocks noGrp="1"/>
+          </p:cNvSpPr>
+          <p:nvPr>
+            <p:ph type="sldNum" sz="quarter" idx="12"/>
+          </p:nvPr>
+        </p:nvSpPr>
+        <p:spPr/>
+        <p:txBody>
+          <a:bodyPr/>
+          <a:lstStyle/>
+          <a:p>
+            <a:fld id="{452661BF-F4F2-4852-B4BE-7723DA5457E7}" type="slidenum">
+              <a:rPr lang="en-GB" smtClean="0"/>
+              <a:t>7</a:t>
+            </a:fld>
+            <a:endParaRPr lang="en-GB"/>
+          </a:p>
+        </p:txBody>
+      </p:sp>
     </p:spTree>
     <p:extLst>
       <p:ext uri="{BB962C8B-B14F-4D97-AF65-F5344CB8AC3E}">
@@ -7782,7 +8281,7 @@
 </p:sld>
 </file>
 
-<file path=ppt/slides/slide6.xml><?xml version="1.0" encoding="utf-8"?>
+<file path=ppt/slides/slide8.xml><?xml version="1.0" encoding="utf-8"?>
 <p:sld xmlns:a="http://schemas.openxmlformats.org/drawingml/2006/main" xmlns:r="http://schemas.openxmlformats.org/officeDocument/2006/relationships" xmlns:p="http://schemas.openxmlformats.org/presentationml/2006/main">
   <p:cSld>
     <p:spTree>
@@ -7864,6 +8363,35 @@
           </a:prstGeom>
         </p:spPr>
       </p:pic>
+      <p:sp>
+        <p:nvSpPr>
+          <p:cNvPr id="3" name="Slide Number Placeholder 2">
+            <a:extLst>
+              <a:ext uri="{FF2B5EF4-FFF2-40B4-BE49-F238E27FC236}">
+                <a16:creationId xmlns:a16="http://schemas.microsoft.com/office/drawing/2014/main" id="{6EBAA7ED-6CCA-490C-B166-CBD860102963}"/>
+              </a:ext>
+            </a:extLst>
+          </p:cNvPr>
+          <p:cNvSpPr>
+            <a:spLocks noGrp="1"/>
+          </p:cNvSpPr>
+          <p:nvPr>
+            <p:ph type="sldNum" sz="quarter" idx="12"/>
+          </p:nvPr>
+        </p:nvSpPr>
+        <p:spPr/>
+        <p:txBody>
+          <a:bodyPr/>
+          <a:lstStyle/>
+          <a:p>
+            <a:fld id="{452661BF-F4F2-4852-B4BE-7723DA5457E7}" type="slidenum">
+              <a:rPr lang="en-GB" smtClean="0"/>
+              <a:t>8</a:t>
+            </a:fld>
+            <a:endParaRPr lang="en-GB"/>
+          </a:p>
+        </p:txBody>
+      </p:sp>
     </p:spTree>
     <p:extLst>
       <p:ext uri="{BB962C8B-B14F-4D97-AF65-F5344CB8AC3E}">
@@ -7877,7 +8405,7 @@
 </p:sld>
 </file>
 
-<file path=ppt/slides/slide7.xml><?xml version="1.0" encoding="utf-8"?>
+<file path=ppt/slides/slide9.xml><?xml version="1.0" encoding="utf-8"?>
 <p:sld xmlns:a="http://schemas.openxmlformats.org/drawingml/2006/main" xmlns:r="http://schemas.openxmlformats.org/officeDocument/2006/relationships" xmlns:p="http://schemas.openxmlformats.org/presentationml/2006/main">
   <p:cSld>
     <p:spTree>
@@ -7912,7 +8440,7 @@
         </p:nvSpPr>
         <p:spPr>
           <a:xfrm rot="16200000">
-            <a:off x="-1234105" y="2369839"/>
+            <a:off x="-1521980" y="2387769"/>
             <a:ext cx="4444490" cy="1400530"/>
           </a:xfrm>
         </p:spPr>
@@ -7957,8 +8485,8 @@
         </p:blipFill>
         <p:spPr bwMode="auto">
           <a:xfrm>
-            <a:off x="1368809" y="0"/>
-            <a:ext cx="10098087" cy="6858000"/>
+            <a:off x="594911" y="0"/>
+            <a:ext cx="9822077" cy="6858000"/>
           </a:xfrm>
           <a:prstGeom prst="rect">
             <a:avLst/>
@@ -7975,216 +8503,39 @@
           </a:extLst>
         </p:spPr>
       </p:pic>
+      <p:sp>
+        <p:nvSpPr>
+          <p:cNvPr id="3" name="Slide Number Placeholder 2">
+            <a:extLst>
+              <a:ext uri="{FF2B5EF4-FFF2-40B4-BE49-F238E27FC236}">
+                <a16:creationId xmlns:a16="http://schemas.microsoft.com/office/drawing/2014/main" id="{4E41C890-48C3-FF88-5D68-439CF0D67B7E}"/>
+              </a:ext>
+            </a:extLst>
+          </p:cNvPr>
+          <p:cNvSpPr>
+            <a:spLocks noGrp="1"/>
+          </p:cNvSpPr>
+          <p:nvPr>
+            <p:ph type="sldNum" sz="quarter" idx="12"/>
+          </p:nvPr>
+        </p:nvSpPr>
+        <p:spPr/>
+        <p:txBody>
+          <a:bodyPr/>
+          <a:lstStyle/>
+          <a:p>
+            <a:fld id="{452661BF-F4F2-4852-B4BE-7723DA5457E7}" type="slidenum">
+              <a:rPr lang="en-GB" smtClean="0"/>
+              <a:t>9</a:t>
+            </a:fld>
+            <a:endParaRPr lang="en-GB"/>
+          </a:p>
+        </p:txBody>
+      </p:sp>
     </p:spTree>
     <p:extLst>
       <p:ext uri="{BB962C8B-B14F-4D97-AF65-F5344CB8AC3E}">
         <p14:creationId xmlns:p14="http://schemas.microsoft.com/office/powerpoint/2010/main" val="2225465962"/>
-      </p:ext>
-    </p:extLst>
-  </p:cSld>
-  <p:clrMapOvr>
-    <a:masterClrMapping/>
-  </p:clrMapOvr>
-</p:sld>
-</file>
-
-<file path=ppt/slides/slide8.xml><?xml version="1.0" encoding="utf-8"?>
-<p:sld xmlns:a="http://schemas.openxmlformats.org/drawingml/2006/main" xmlns:r="http://schemas.openxmlformats.org/officeDocument/2006/relationships" xmlns:p="http://schemas.openxmlformats.org/presentationml/2006/main">
-  <p:cSld>
-    <p:spTree>
-      <p:nvGrpSpPr>
-        <p:cNvPr id="1" name=""/>
-        <p:cNvGrpSpPr/>
-        <p:nvPr/>
-      </p:nvGrpSpPr>
-      <p:grpSpPr>
-        <a:xfrm>
-          <a:off x="0" y="0"/>
-          <a:ext cx="0" cy="0"/>
-          <a:chOff x="0" y="0"/>
-          <a:chExt cx="0" cy="0"/>
-        </a:xfrm>
-      </p:grpSpPr>
-      <p:sp>
-        <p:nvSpPr>
-          <p:cNvPr id="2" name="Title 1">
-            <a:extLst>
-              <a:ext uri="{FF2B5EF4-FFF2-40B4-BE49-F238E27FC236}">
-                <a16:creationId xmlns:a16="http://schemas.microsoft.com/office/drawing/2014/main" id="{A6F56FBE-8279-4765-9FB3-D4A032F08FBC}"/>
-              </a:ext>
-            </a:extLst>
-          </p:cNvPr>
-          <p:cNvSpPr>
-            <a:spLocks noGrp="1"/>
-          </p:cNvSpPr>
-          <p:nvPr>
-            <p:ph type="title"/>
-          </p:nvPr>
-        </p:nvSpPr>
-        <p:spPr>
-          <a:xfrm rot="16200000">
-            <a:off x="-1234105" y="2369839"/>
-            <a:ext cx="4444490" cy="1400530"/>
-          </a:xfrm>
-        </p:spPr>
-        <p:txBody>
-          <a:bodyPr/>
-          <a:lstStyle/>
-          <a:p>
-            <a:r>
-              <a:rPr lang="en-US" dirty="0"/>
-              <a:t>ER DIAGRAM</a:t>
-            </a:r>
-            <a:endParaRPr lang="en-GB" dirty="0"/>
-          </a:p>
-        </p:txBody>
-      </p:sp>
-      <p:pic>
-        <p:nvPicPr>
-          <p:cNvPr id="4" name="Picture 3">
-            <a:extLst>
-              <a:ext uri="{FF2B5EF4-FFF2-40B4-BE49-F238E27FC236}">
-                <a16:creationId xmlns:a16="http://schemas.microsoft.com/office/drawing/2014/main" id="{D7E1C4C8-DCE9-2937-8B39-24D3840D2EC2}"/>
-              </a:ext>
-            </a:extLst>
-          </p:cNvPr>
-          <p:cNvPicPr>
-            <a:picLocks noChangeAspect="1"/>
-          </p:cNvPicPr>
-          <p:nvPr/>
-        </p:nvPicPr>
-        <p:blipFill>
-          <a:blip r:embed="rId2">
-            <a:extLst>
-              <a:ext uri="{28A0092B-C50C-407E-A947-70E740481C1C}">
-                <a14:useLocalDpi xmlns:a14="http://schemas.microsoft.com/office/drawing/2010/main" val="0"/>
-              </a:ext>
-            </a:extLst>
-          </a:blip>
-          <a:stretch>
-            <a:fillRect/>
-          </a:stretch>
-        </p:blipFill>
-        <p:spPr>
-          <a:xfrm>
-            <a:off x="977153" y="89646"/>
-            <a:ext cx="10614211" cy="6768353"/>
-          </a:xfrm>
-          <a:prstGeom prst="rect">
-            <a:avLst/>
-          </a:prstGeom>
-        </p:spPr>
-      </p:pic>
-    </p:spTree>
-    <p:extLst>
-      <p:ext uri="{BB962C8B-B14F-4D97-AF65-F5344CB8AC3E}">
-        <p14:creationId xmlns:p14="http://schemas.microsoft.com/office/powerpoint/2010/main" val="410575750"/>
-      </p:ext>
-    </p:extLst>
-  </p:cSld>
-  <p:clrMapOvr>
-    <a:masterClrMapping/>
-  </p:clrMapOvr>
-</p:sld>
-</file>
-
-<file path=ppt/slides/slide9.xml><?xml version="1.0" encoding="utf-8"?>
-<p:sld xmlns:a="http://schemas.openxmlformats.org/drawingml/2006/main" xmlns:r="http://schemas.openxmlformats.org/officeDocument/2006/relationships" xmlns:p="http://schemas.openxmlformats.org/presentationml/2006/main">
-  <p:cSld>
-    <p:spTree>
-      <p:nvGrpSpPr>
-        <p:cNvPr id="1" name="">
-          <a:extLst>
-            <a:ext uri="{FF2B5EF4-FFF2-40B4-BE49-F238E27FC236}">
-              <a16:creationId xmlns:a16="http://schemas.microsoft.com/office/drawing/2014/main" id="{BEA3E5F7-74BB-6106-3B49-D0F322B2FE0A}"/>
-            </a:ext>
-          </a:extLst>
-        </p:cNvPr>
-        <p:cNvGrpSpPr/>
-        <p:nvPr/>
-      </p:nvGrpSpPr>
-      <p:grpSpPr>
-        <a:xfrm>
-          <a:off x="0" y="0"/>
-          <a:ext cx="0" cy="0"/>
-          <a:chOff x="0" y="0"/>
-          <a:chExt cx="0" cy="0"/>
-        </a:xfrm>
-      </p:grpSpPr>
-      <p:sp>
-        <p:nvSpPr>
-          <p:cNvPr id="2" name="Title 1">
-            <a:extLst>
-              <a:ext uri="{FF2B5EF4-FFF2-40B4-BE49-F238E27FC236}">
-                <a16:creationId xmlns:a16="http://schemas.microsoft.com/office/drawing/2014/main" id="{0FD4C8C8-65B5-BA27-F8D6-672538516AC6}"/>
-              </a:ext>
-            </a:extLst>
-          </p:cNvPr>
-          <p:cNvSpPr>
-            <a:spLocks noGrp="1"/>
-          </p:cNvSpPr>
-          <p:nvPr>
-            <p:ph type="title"/>
-          </p:nvPr>
-        </p:nvSpPr>
-        <p:spPr>
-          <a:xfrm rot="16200000">
-            <a:off x="-1234105" y="2369839"/>
-            <a:ext cx="4444490" cy="1400530"/>
-          </a:xfrm>
-        </p:spPr>
-        <p:txBody>
-          <a:bodyPr/>
-          <a:lstStyle/>
-          <a:p>
-            <a:r>
-              <a:rPr lang="en-US" dirty="0"/>
-              <a:t>DFD Level -2</a:t>
-            </a:r>
-            <a:endParaRPr lang="en-GB" dirty="0"/>
-          </a:p>
-        </p:txBody>
-      </p:sp>
-      <p:pic>
-        <p:nvPicPr>
-          <p:cNvPr id="4" name="Picture 3">
-            <a:extLst>
-              <a:ext uri="{FF2B5EF4-FFF2-40B4-BE49-F238E27FC236}">
-                <a16:creationId xmlns:a16="http://schemas.microsoft.com/office/drawing/2014/main" id="{A4E4193F-2C71-0A94-3538-C98F98E90A5B}"/>
-              </a:ext>
-            </a:extLst>
-          </p:cNvPr>
-          <p:cNvPicPr>
-            <a:picLocks noChangeAspect="1"/>
-          </p:cNvPicPr>
-          <p:nvPr/>
-        </p:nvPicPr>
-        <p:blipFill>
-          <a:blip r:embed="rId2">
-            <a:extLst>
-              <a:ext uri="{28A0092B-C50C-407E-A947-70E740481C1C}">
-                <a14:useLocalDpi xmlns:a14="http://schemas.microsoft.com/office/drawing/2010/main" val="0"/>
-              </a:ext>
-            </a:extLst>
-          </a:blip>
-          <a:stretch>
-            <a:fillRect/>
-          </a:stretch>
-        </p:blipFill>
-        <p:spPr>
-          <a:xfrm>
-            <a:off x="1052857" y="331694"/>
-            <a:ext cx="10931954" cy="6311154"/>
-          </a:xfrm>
-          <a:prstGeom prst="rect">
-            <a:avLst/>
-          </a:prstGeom>
-        </p:spPr>
-      </p:pic>
-    </p:spTree>
-    <p:extLst>
-      <p:ext uri="{BB962C8B-B14F-4D97-AF65-F5344CB8AC3E}">
-        <p14:creationId xmlns:p14="http://schemas.microsoft.com/office/powerpoint/2010/main" val="226524632"/>
       </p:ext>
     </p:extLst>
   </p:cSld>
@@ -8458,4 +8809,299 @@
     </a:ext>
   </a:extLst>
 </a:theme>
+</file>
+
+<file path=ppt/theme/theme2.xml><?xml version="1.0" encoding="utf-8"?>
+<a:theme xmlns:a="http://schemas.openxmlformats.org/drawingml/2006/main" name="Office Theme">
+  <a:themeElements>
+    <a:clrScheme name="Office">
+      <a:dk1>
+        <a:sysClr val="windowText" lastClr="000000"/>
+      </a:dk1>
+      <a:lt1>
+        <a:sysClr val="window" lastClr="FFFFFF"/>
+      </a:lt1>
+      <a:dk2>
+        <a:srgbClr val="44546A"/>
+      </a:dk2>
+      <a:lt2>
+        <a:srgbClr val="E7E6E6"/>
+      </a:lt2>
+      <a:accent1>
+        <a:srgbClr val="4472C4"/>
+      </a:accent1>
+      <a:accent2>
+        <a:srgbClr val="ED7D31"/>
+      </a:accent2>
+      <a:accent3>
+        <a:srgbClr val="A5A5A5"/>
+      </a:accent3>
+      <a:accent4>
+        <a:srgbClr val="FFC000"/>
+      </a:accent4>
+      <a:accent5>
+        <a:srgbClr val="5B9BD5"/>
+      </a:accent5>
+      <a:accent6>
+        <a:srgbClr val="70AD47"/>
+      </a:accent6>
+      <a:hlink>
+        <a:srgbClr val="0563C1"/>
+      </a:hlink>
+      <a:folHlink>
+        <a:srgbClr val="954F72"/>
+      </a:folHlink>
+    </a:clrScheme>
+    <a:fontScheme name="Office">
+      <a:majorFont>
+        <a:latin typeface="Calibri Light" panose="020F0302020204030204"/>
+        <a:ea typeface=""/>
+        <a:cs typeface=""/>
+        <a:font script="Jpan" typeface="游ゴシック Light"/>
+        <a:font script="Hang" typeface="맑은 고딕"/>
+        <a:font script="Hans" typeface="等线 Light"/>
+        <a:font script="Hant" typeface="新細明體"/>
+        <a:font script="Arab" typeface="Times New Roman"/>
+        <a:font script="Hebr" typeface="Times New Roman"/>
+        <a:font script="Thai" typeface="Angsana New"/>
+        <a:font script="Ethi" typeface="Nyala"/>
+        <a:font script="Beng" typeface="Vrinda"/>
+        <a:font script="Gujr" typeface="Shruti"/>
+        <a:font script="Khmr" typeface="MoolBoran"/>
+        <a:font script="Knda" typeface="Tunga"/>
+        <a:font script="Guru" typeface="Raavi"/>
+        <a:font script="Cans" typeface="Euphemia"/>
+        <a:font script="Cher" typeface="Plantagenet Cherokee"/>
+        <a:font script="Yiii" typeface="Microsoft Yi Baiti"/>
+        <a:font script="Tibt" typeface="Microsoft Himalaya"/>
+        <a:font script="Thaa" typeface="MV Boli"/>
+        <a:font script="Deva" typeface="Mangal"/>
+        <a:font script="Telu" typeface="Gautami"/>
+        <a:font script="Taml" typeface="Latha"/>
+        <a:font script="Syrc" typeface="Estrangelo Edessa"/>
+        <a:font script="Orya" typeface="Kalinga"/>
+        <a:font script="Mlym" typeface="Kartika"/>
+        <a:font script="Laoo" typeface="DokChampa"/>
+        <a:font script="Sinh" typeface="Iskoola Pota"/>
+        <a:font script="Mong" typeface="Mongolian Baiti"/>
+        <a:font script="Viet" typeface="Times New Roman"/>
+        <a:font script="Uigh" typeface="Microsoft Uighur"/>
+        <a:font script="Geor" typeface="Sylfaen"/>
+        <a:font script="Armn" typeface="Arial"/>
+        <a:font script="Bugi" typeface="Leelawadee UI"/>
+        <a:font script="Bopo" typeface="Microsoft JhengHei"/>
+        <a:font script="Java" typeface="Javanese Text"/>
+        <a:font script="Lisu" typeface="Segoe UI"/>
+        <a:font script="Mymr" typeface="Myanmar Text"/>
+        <a:font script="Nkoo" typeface="Ebrima"/>
+        <a:font script="Olck" typeface="Nirmala UI"/>
+        <a:font script="Osma" typeface="Ebrima"/>
+        <a:font script="Phag" typeface="Phagspa"/>
+        <a:font script="Syrn" typeface="Estrangelo Edessa"/>
+        <a:font script="Syrj" typeface="Estrangelo Edessa"/>
+        <a:font script="Syre" typeface="Estrangelo Edessa"/>
+        <a:font script="Sora" typeface="Nirmala UI"/>
+        <a:font script="Tale" typeface="Microsoft Tai Le"/>
+        <a:font script="Talu" typeface="Microsoft New Tai Lue"/>
+        <a:font script="Tfng" typeface="Ebrima"/>
+      </a:majorFont>
+      <a:minorFont>
+        <a:latin typeface="Calibri" panose="020F0502020204030204"/>
+        <a:ea typeface=""/>
+        <a:cs typeface=""/>
+        <a:font script="Jpan" typeface="游ゴシック"/>
+        <a:font script="Hang" typeface="맑은 고딕"/>
+        <a:font script="Hans" typeface="等线"/>
+        <a:font script="Hant" typeface="新細明體"/>
+        <a:font script="Arab" typeface="Arial"/>
+        <a:font script="Hebr" typeface="Arial"/>
+        <a:font script="Thai" typeface="Cordia New"/>
+        <a:font script="Ethi" typeface="Nyala"/>
+        <a:font script="Beng" typeface="Vrinda"/>
+        <a:font script="Gujr" typeface="Shruti"/>
+        <a:font script="Khmr" typeface="DaunPenh"/>
+        <a:font script="Knda" typeface="Tunga"/>
+        <a:font script="Guru" typeface="Raavi"/>
+        <a:font script="Cans" typeface="Euphemia"/>
+        <a:font script="Cher" typeface="Plantagenet Cherokee"/>
+        <a:font script="Yiii" typeface="Microsoft Yi Baiti"/>
+        <a:font script="Tibt" typeface="Microsoft Himalaya"/>
+        <a:font script="Thaa" typeface="MV Boli"/>
+        <a:font script="Deva" typeface="Mangal"/>
+        <a:font script="Telu" typeface="Gautami"/>
+        <a:font script="Taml" typeface="Latha"/>
+        <a:font script="Syrc" typeface="Estrangelo Edessa"/>
+        <a:font script="Orya" typeface="Kalinga"/>
+        <a:font script="Mlym" typeface="Kartika"/>
+        <a:font script="Laoo" typeface="DokChampa"/>
+        <a:font script="Sinh" typeface="Iskoola Pota"/>
+        <a:font script="Mong" typeface="Mongolian Baiti"/>
+        <a:font script="Viet" typeface="Arial"/>
+        <a:font script="Uigh" typeface="Microsoft Uighur"/>
+        <a:font script="Geor" typeface="Sylfaen"/>
+        <a:font script="Armn" typeface="Arial"/>
+        <a:font script="Bugi" typeface="Leelawadee UI"/>
+        <a:font script="Bopo" typeface="Microsoft JhengHei"/>
+        <a:font script="Java" typeface="Javanese Text"/>
+        <a:font script="Lisu" typeface="Segoe UI"/>
+        <a:font script="Mymr" typeface="Myanmar Text"/>
+        <a:font script="Nkoo" typeface="Ebrima"/>
+        <a:font script="Olck" typeface="Nirmala UI"/>
+        <a:font script="Osma" typeface="Ebrima"/>
+        <a:font script="Phag" typeface="Phagspa"/>
+        <a:font script="Syrn" typeface="Estrangelo Edessa"/>
+        <a:font script="Syrj" typeface="Estrangelo Edessa"/>
+        <a:font script="Syre" typeface="Estrangelo Edessa"/>
+        <a:font script="Sora" typeface="Nirmala UI"/>
+        <a:font script="Tale" typeface="Microsoft Tai Le"/>
+        <a:font script="Talu" typeface="Microsoft New Tai Lue"/>
+        <a:font script="Tfng" typeface="Ebrima"/>
+      </a:minorFont>
+    </a:fontScheme>
+    <a:fmtScheme name="Office">
+      <a:fillStyleLst>
+        <a:solidFill>
+          <a:schemeClr val="phClr"/>
+        </a:solidFill>
+        <a:gradFill rotWithShape="1">
+          <a:gsLst>
+            <a:gs pos="0">
+              <a:schemeClr val="phClr">
+                <a:lumMod val="110000"/>
+                <a:satMod val="105000"/>
+                <a:tint val="67000"/>
+              </a:schemeClr>
+            </a:gs>
+            <a:gs pos="50000">
+              <a:schemeClr val="phClr">
+                <a:lumMod val="105000"/>
+                <a:satMod val="103000"/>
+                <a:tint val="73000"/>
+              </a:schemeClr>
+            </a:gs>
+            <a:gs pos="100000">
+              <a:schemeClr val="phClr">
+                <a:lumMod val="105000"/>
+                <a:satMod val="109000"/>
+                <a:tint val="81000"/>
+              </a:schemeClr>
+            </a:gs>
+          </a:gsLst>
+          <a:lin ang="5400000" scaled="0"/>
+        </a:gradFill>
+        <a:gradFill rotWithShape="1">
+          <a:gsLst>
+            <a:gs pos="0">
+              <a:schemeClr val="phClr">
+                <a:satMod val="103000"/>
+                <a:lumMod val="102000"/>
+                <a:tint val="94000"/>
+              </a:schemeClr>
+            </a:gs>
+            <a:gs pos="50000">
+              <a:schemeClr val="phClr">
+                <a:satMod val="110000"/>
+                <a:lumMod val="100000"/>
+                <a:shade val="100000"/>
+              </a:schemeClr>
+            </a:gs>
+            <a:gs pos="100000">
+              <a:schemeClr val="phClr">
+                <a:lumMod val="99000"/>
+                <a:satMod val="120000"/>
+                <a:shade val="78000"/>
+              </a:schemeClr>
+            </a:gs>
+          </a:gsLst>
+          <a:lin ang="5400000" scaled="0"/>
+        </a:gradFill>
+      </a:fillStyleLst>
+      <a:lnStyleLst>
+        <a:ln w="6350" cap="flat" cmpd="sng" algn="ctr">
+          <a:solidFill>
+            <a:schemeClr val="phClr"/>
+          </a:solidFill>
+          <a:prstDash val="solid"/>
+          <a:miter lim="800000"/>
+        </a:ln>
+        <a:ln w="12700" cap="flat" cmpd="sng" algn="ctr">
+          <a:solidFill>
+            <a:schemeClr val="phClr"/>
+          </a:solidFill>
+          <a:prstDash val="solid"/>
+          <a:miter lim="800000"/>
+        </a:ln>
+        <a:ln w="19050" cap="flat" cmpd="sng" algn="ctr">
+          <a:solidFill>
+            <a:schemeClr val="phClr"/>
+          </a:solidFill>
+          <a:prstDash val="solid"/>
+          <a:miter lim="800000"/>
+        </a:ln>
+      </a:lnStyleLst>
+      <a:effectStyleLst>
+        <a:effectStyle>
+          <a:effectLst/>
+        </a:effectStyle>
+        <a:effectStyle>
+          <a:effectLst/>
+        </a:effectStyle>
+        <a:effectStyle>
+          <a:effectLst>
+            <a:outerShdw blurRad="57150" dist="19050" dir="5400000" algn="ctr" rotWithShape="0">
+              <a:srgbClr val="000000">
+                <a:alpha val="63000"/>
+              </a:srgbClr>
+            </a:outerShdw>
+          </a:effectLst>
+        </a:effectStyle>
+      </a:effectStyleLst>
+      <a:bgFillStyleLst>
+        <a:solidFill>
+          <a:schemeClr val="phClr"/>
+        </a:solidFill>
+        <a:solidFill>
+          <a:schemeClr val="phClr">
+            <a:tint val="95000"/>
+            <a:satMod val="170000"/>
+          </a:schemeClr>
+        </a:solidFill>
+        <a:gradFill rotWithShape="1">
+          <a:gsLst>
+            <a:gs pos="0">
+              <a:schemeClr val="phClr">
+                <a:tint val="93000"/>
+                <a:satMod val="150000"/>
+                <a:shade val="98000"/>
+                <a:lumMod val="102000"/>
+              </a:schemeClr>
+            </a:gs>
+            <a:gs pos="50000">
+              <a:schemeClr val="phClr">
+                <a:tint val="98000"/>
+                <a:satMod val="130000"/>
+                <a:shade val="90000"/>
+                <a:lumMod val="103000"/>
+              </a:schemeClr>
+            </a:gs>
+            <a:gs pos="100000">
+              <a:schemeClr val="phClr">
+                <a:shade val="63000"/>
+                <a:satMod val="120000"/>
+              </a:schemeClr>
+            </a:gs>
+          </a:gsLst>
+          <a:lin ang="5400000" scaled="0"/>
+        </a:gradFill>
+      </a:bgFillStyleLst>
+    </a:fmtScheme>
+  </a:themeElements>
+  <a:objectDefaults/>
+  <a:extraClrSchemeLst/>
+  <a:extLst>
+    <a:ext uri="{05A4C25C-085E-4340-85A3-A5531E510DB2}">
+      <thm15:themeFamily xmlns:thm15="http://schemas.microsoft.com/office/thememl/2012/main" name="Office Theme" id="{62F939B6-93AF-4DB8-9C6B-D6C7DFDC589F}" vid="{4A3C46E8-61CC-4603-A589-7422A47A8E4A}"/>
+    </a:ext>
+  </a:extLst>
+</a:theme>
 </file>
</xml_diff>